<commit_message>
cambio en roles del equipo
</commit_message>
<xml_diff>
--- a/Fase 1/Evidencias Grupales/Presentación Proyecto StudyForge.pptx
+++ b/Fase 1/Evidencias Grupales/Presentación Proyecto StudyForge.pptx
@@ -1,45 +1,45 @@
 
 <file path=ppt/presentation.xml><?xml version="1.0" encoding="utf-8"?>
-<p:presentation xmlns:a="http://schemas.openxmlformats.org/drawingml/2006/main" xmlns:r="http://schemas.openxmlformats.org/officeDocument/2006/relationships" xmlns:p="http://schemas.openxmlformats.org/presentationml/2006/main" saveSubsetFonts="1" embedTrueTypeFonts="true">
+<p:presentation xmlns:a="http://schemas.openxmlformats.org/drawingml/2006/main" xmlns:r="http://schemas.openxmlformats.org/officeDocument/2006/relationships" xmlns:p="http://schemas.openxmlformats.org/presentationml/2006/main" embedTrueTypeFonts="1" saveSubsetFonts="1">
   <p:sldMasterIdLst>
     <p:sldMasterId id="2147483648" r:id="rId1"/>
   </p:sldMasterIdLst>
   <p:sldIdLst>
-    <p:sldId id="256" r:id="rId6"/>
-    <p:sldId id="257" r:id="rId7"/>
-    <p:sldId id="258" r:id="rId8"/>
-    <p:sldId id="259" r:id="rId9"/>
-    <p:sldId id="260" r:id="rId10"/>
-    <p:sldId id="261" r:id="rId11"/>
-    <p:sldId id="262" r:id="rId12"/>
-    <p:sldId id="263" r:id="rId13"/>
+    <p:sldId id="256" r:id="rId2"/>
+    <p:sldId id="257" r:id="rId3"/>
+    <p:sldId id="258" r:id="rId4"/>
+    <p:sldId id="259" r:id="rId5"/>
+    <p:sldId id="260" r:id="rId6"/>
+    <p:sldId id="261" r:id="rId7"/>
+    <p:sldId id="262" r:id="rId8"/>
+    <p:sldId id="263" r:id="rId9"/>
   </p:sldIdLst>
   <p:sldSz cx="18288000" cy="10287000"/>
   <p:notesSz cx="6858000" cy="9144000"/>
   <p:embeddedFontLst>
     <p:embeddedFont>
-      <p:font typeface="Open Sans Bold" charset="1" panose="020B0806030504020204"/>
+      <p:font typeface="Flatory Sans SemiCondensed Medium" panose="020B0604020202020204" charset="-34"/>
+      <p:regular r:id="rId10"/>
+    </p:embeddedFont>
+    <p:embeddedFont>
+      <p:font typeface="Montserrat" panose="020F0502020204030204" pitchFamily="2" charset="0"/>
+      <p:regular r:id="rId11"/>
+    </p:embeddedFont>
+    <p:embeddedFont>
+      <p:font typeface="Montserrat Bold" panose="020B0604020202020204" charset="0"/>
+      <p:regular r:id="rId12"/>
+    </p:embeddedFont>
+    <p:embeddedFont>
+      <p:font typeface="Montserrat Medium" panose="020F0502020204030204" pitchFamily="2" charset="0"/>
+      <p:regular r:id="rId13"/>
+    </p:embeddedFont>
+    <p:embeddedFont>
+      <p:font typeface="Open Sans" panose="020F0502020204030204" pitchFamily="34" charset="0"/>
       <p:regular r:id="rId14"/>
     </p:embeddedFont>
     <p:embeddedFont>
-      <p:font typeface="Open Sans" charset="1" panose="020B0606030504020204"/>
+      <p:font typeface="Open Sans Bold" panose="020B0604020202020204" charset="0"/>
       <p:regular r:id="rId15"/>
-    </p:embeddedFont>
-    <p:embeddedFont>
-      <p:font typeface="Montserrat" charset="1" panose="00000500000000000000"/>
-      <p:regular r:id="rId16"/>
-    </p:embeddedFont>
-    <p:embeddedFont>
-      <p:font typeface="Flatory Sans SemiCondensed Medium" charset="1" panose="00000000000000000000"/>
-      <p:regular r:id="rId17"/>
-    </p:embeddedFont>
-    <p:embeddedFont>
-      <p:font typeface="Montserrat Bold" charset="1" panose="00000800000000000000"/>
-      <p:regular r:id="rId18"/>
-    </p:embeddedFont>
-    <p:embeddedFont>
-      <p:font typeface="Montserrat Medium" charset="1" panose="00000600000000000000"/>
-      <p:regular r:id="rId19"/>
     </p:embeddedFont>
   </p:embeddedFontLst>
   <p:defaultTextStyle>
@@ -137,6 +137,22 @@
       </a:defRPr>
     </a:lvl9pPr>
   </p:defaultTextStyle>
+  <p:extLst>
+    <p:ext uri="{EFAFB233-063F-42B5-8137-9DF3F51BA10A}">
+      <p15:sldGuideLst xmlns:p15="http://schemas.microsoft.com/office/powerpoint/2012/main">
+        <p15:guide id="1" orient="horz" pos="2160">
+          <p15:clr>
+            <a:srgbClr val="A4A3A4"/>
+          </p15:clr>
+        </p15:guide>
+        <p15:guide id="2" pos="2880">
+          <p15:clr>
+            <a:srgbClr val="A4A3A4"/>
+          </p15:clr>
+        </p15:guide>
+      </p15:sldGuideLst>
+    </p:ext>
+  </p:extLst>
 </p:presentation>
 </file>
 
@@ -178,10 +194,9 @@
           <a:lstStyle/>
           <a:p>
             <a:r>
-              <a:rPr lang="en-US" smtClean="0"/>
+              <a:rPr lang="en-US"/>
               <a:t>Click to edit Master title style</a:t>
             </a:r>
-            <a:endParaRPr lang="en-US"/>
           </a:p>
         </p:txBody>
       </p:sp>
@@ -297,10 +312,9 @@
           </a:lstStyle>
           <a:p>
             <a:r>
-              <a:rPr lang="en-US" smtClean="0"/>
+              <a:rPr lang="en-US"/>
               <a:t>Click to edit Master subtitle style</a:t>
             </a:r>
-            <a:endParaRPr lang="en-US"/>
           </a:p>
         </p:txBody>
       </p:sp>
@@ -322,7 +336,7 @@
             <a:fld id="{1D8BD707-D9CF-40AE-B4C6-C98DA3205C09}" type="datetimeFigureOut">
               <a:rPr lang="en-US" smtClean="0"/>
               <a:pPr/>
-              <a:t>8/1/2011</a:t>
+              <a:t>9/3/2025</a:t>
             </a:fld>
             <a:endParaRPr lang="en-US"/>
           </a:p>
@@ -365,7 +379,7 @@
             <a:fld id="{B6F15528-21DE-4FAA-801E-634DDDAF4B2B}" type="slidenum">
               <a:rPr lang="en-US" smtClean="0"/>
               <a:pPr/>
-              <a:t>‹#›</a:t>
+              <a:t>‹Nº›</a:t>
             </a:fld>
             <a:endParaRPr lang="en-US"/>
           </a:p>
@@ -412,10 +426,9 @@
           <a:lstStyle/>
           <a:p>
             <a:r>
-              <a:rPr lang="en-US" smtClean="0"/>
+              <a:rPr lang="en-US"/>
               <a:t>Click to edit Master title style</a:t>
             </a:r>
-            <a:endParaRPr lang="en-US"/>
           </a:p>
         </p:txBody>
       </p:sp>
@@ -436,38 +449,37 @@
           <a:p>
             <a:pPr lvl="0"/>
             <a:r>
-              <a:rPr lang="en-US" smtClean="0"/>
+              <a:rPr lang="en-US"/>
               <a:t>Click to edit Master text styles</a:t>
             </a:r>
           </a:p>
           <a:p>
             <a:pPr lvl="1"/>
             <a:r>
-              <a:rPr lang="en-US" smtClean="0"/>
+              <a:rPr lang="en-US"/>
               <a:t>Second level</a:t>
             </a:r>
           </a:p>
           <a:p>
             <a:pPr lvl="2"/>
             <a:r>
-              <a:rPr lang="en-US" smtClean="0"/>
+              <a:rPr lang="en-US"/>
               <a:t>Third level</a:t>
             </a:r>
           </a:p>
           <a:p>
             <a:pPr lvl="3"/>
             <a:r>
-              <a:rPr lang="en-US" smtClean="0"/>
+              <a:rPr lang="en-US"/>
               <a:t>Fourth level</a:t>
             </a:r>
           </a:p>
           <a:p>
             <a:pPr lvl="4"/>
             <a:r>
-              <a:rPr lang="en-US" smtClean="0"/>
+              <a:rPr lang="en-US"/>
               <a:t>Fifth level</a:t>
             </a:r>
-            <a:endParaRPr lang="en-US"/>
           </a:p>
         </p:txBody>
       </p:sp>
@@ -489,7 +501,7 @@
             <a:fld id="{1D8BD707-D9CF-40AE-B4C6-C98DA3205C09}" type="datetimeFigureOut">
               <a:rPr lang="en-US" smtClean="0"/>
               <a:pPr/>
-              <a:t>8/1/2011</a:t>
+              <a:t>9/3/2025</a:t>
             </a:fld>
             <a:endParaRPr lang="en-US"/>
           </a:p>
@@ -532,7 +544,7 @@
             <a:fld id="{B6F15528-21DE-4FAA-801E-634DDDAF4B2B}" type="slidenum">
               <a:rPr lang="en-US" smtClean="0"/>
               <a:pPr/>
-              <a:t>‹#›</a:t>
+              <a:t>‹Nº›</a:t>
             </a:fld>
             <a:endParaRPr lang="en-US"/>
           </a:p>
@@ -584,10 +596,9 @@
           <a:lstStyle/>
           <a:p>
             <a:r>
-              <a:rPr lang="en-US" smtClean="0"/>
+              <a:rPr lang="en-US"/>
               <a:t>Click to edit Master title style</a:t>
             </a:r>
-            <a:endParaRPr lang="en-US"/>
           </a:p>
         </p:txBody>
       </p:sp>
@@ -613,38 +624,37 @@
           <a:p>
             <a:pPr lvl="0"/>
             <a:r>
-              <a:rPr lang="en-US" smtClean="0"/>
+              <a:rPr lang="en-US"/>
               <a:t>Click to edit Master text styles</a:t>
             </a:r>
           </a:p>
           <a:p>
             <a:pPr lvl="1"/>
             <a:r>
-              <a:rPr lang="en-US" smtClean="0"/>
+              <a:rPr lang="en-US"/>
               <a:t>Second level</a:t>
             </a:r>
           </a:p>
           <a:p>
             <a:pPr lvl="2"/>
             <a:r>
-              <a:rPr lang="en-US" smtClean="0"/>
+              <a:rPr lang="en-US"/>
               <a:t>Third level</a:t>
             </a:r>
           </a:p>
           <a:p>
             <a:pPr lvl="3"/>
             <a:r>
-              <a:rPr lang="en-US" smtClean="0"/>
+              <a:rPr lang="en-US"/>
               <a:t>Fourth level</a:t>
             </a:r>
           </a:p>
           <a:p>
             <a:pPr lvl="4"/>
             <a:r>
-              <a:rPr lang="en-US" smtClean="0"/>
+              <a:rPr lang="en-US"/>
               <a:t>Fifth level</a:t>
             </a:r>
-            <a:endParaRPr lang="en-US"/>
           </a:p>
         </p:txBody>
       </p:sp>
@@ -666,7 +676,7 @@
             <a:fld id="{1D8BD707-D9CF-40AE-B4C6-C98DA3205C09}" type="datetimeFigureOut">
               <a:rPr lang="en-US" smtClean="0"/>
               <a:pPr/>
-              <a:t>8/1/2011</a:t>
+              <a:t>9/3/2025</a:t>
             </a:fld>
             <a:endParaRPr lang="en-US"/>
           </a:p>
@@ -709,7 +719,7 @@
             <a:fld id="{B6F15528-21DE-4FAA-801E-634DDDAF4B2B}" type="slidenum">
               <a:rPr lang="en-US" smtClean="0"/>
               <a:pPr/>
-              <a:t>‹#›</a:t>
+              <a:t>‹Nº›</a:t>
             </a:fld>
             <a:endParaRPr lang="en-US"/>
           </a:p>
@@ -756,10 +766,9 @@
           <a:lstStyle/>
           <a:p>
             <a:r>
-              <a:rPr lang="en-US" smtClean="0"/>
+              <a:rPr lang="en-US"/>
               <a:t>Click to edit Master title style</a:t>
             </a:r>
-            <a:endParaRPr lang="en-US"/>
           </a:p>
         </p:txBody>
       </p:sp>
@@ -780,38 +789,37 @@
           <a:p>
             <a:pPr lvl="0"/>
             <a:r>
-              <a:rPr lang="en-US" smtClean="0"/>
+              <a:rPr lang="en-US"/>
               <a:t>Click to edit Master text styles</a:t>
             </a:r>
           </a:p>
           <a:p>
             <a:pPr lvl="1"/>
             <a:r>
-              <a:rPr lang="en-US" smtClean="0"/>
+              <a:rPr lang="en-US"/>
               <a:t>Second level</a:t>
             </a:r>
           </a:p>
           <a:p>
             <a:pPr lvl="2"/>
             <a:r>
-              <a:rPr lang="en-US" smtClean="0"/>
+              <a:rPr lang="en-US"/>
               <a:t>Third level</a:t>
             </a:r>
           </a:p>
           <a:p>
             <a:pPr lvl="3"/>
             <a:r>
-              <a:rPr lang="en-US" smtClean="0"/>
+              <a:rPr lang="en-US"/>
               <a:t>Fourth level</a:t>
             </a:r>
           </a:p>
           <a:p>
             <a:pPr lvl="4"/>
             <a:r>
-              <a:rPr lang="en-US" smtClean="0"/>
+              <a:rPr lang="en-US"/>
               <a:t>Fifth level</a:t>
             </a:r>
-            <a:endParaRPr lang="en-US"/>
           </a:p>
         </p:txBody>
       </p:sp>
@@ -833,7 +841,7 @@
             <a:fld id="{1D8BD707-D9CF-40AE-B4C6-C98DA3205C09}" type="datetimeFigureOut">
               <a:rPr lang="en-US" smtClean="0"/>
               <a:pPr/>
-              <a:t>8/1/2011</a:t>
+              <a:t>9/3/2025</a:t>
             </a:fld>
             <a:endParaRPr lang="en-US"/>
           </a:p>
@@ -876,7 +884,7 @@
             <a:fld id="{B6F15528-21DE-4FAA-801E-634DDDAF4B2B}" type="slidenum">
               <a:rPr lang="en-US" smtClean="0"/>
               <a:pPr/>
-              <a:t>‹#›</a:t>
+              <a:t>‹Nº›</a:t>
             </a:fld>
             <a:endParaRPr lang="en-US"/>
           </a:p>
@@ -932,10 +940,9 @@
           </a:lstStyle>
           <a:p>
             <a:r>
-              <a:rPr lang="en-US" smtClean="0"/>
+              <a:rPr lang="en-US"/>
               <a:t>Click to edit Master title style</a:t>
             </a:r>
-            <a:endParaRPr lang="en-US"/>
           </a:p>
         </p:txBody>
       </p:sp>
@@ -1052,7 +1059,7 @@
           <a:p>
             <a:pPr lvl="0"/>
             <a:r>
-              <a:rPr lang="en-US" smtClean="0"/>
+              <a:rPr lang="en-US"/>
               <a:t>Click to edit Master text styles</a:t>
             </a:r>
           </a:p>
@@ -1076,7 +1083,7 @@
             <a:fld id="{1D8BD707-D9CF-40AE-B4C6-C98DA3205C09}" type="datetimeFigureOut">
               <a:rPr lang="en-US" smtClean="0"/>
               <a:pPr/>
-              <a:t>8/1/2011</a:t>
+              <a:t>9/3/2025</a:t>
             </a:fld>
             <a:endParaRPr lang="en-US"/>
           </a:p>
@@ -1119,7 +1126,7 @@
             <a:fld id="{B6F15528-21DE-4FAA-801E-634DDDAF4B2B}" type="slidenum">
               <a:rPr lang="en-US" smtClean="0"/>
               <a:pPr/>
-              <a:t>‹#›</a:t>
+              <a:t>‹Nº›</a:t>
             </a:fld>
             <a:endParaRPr lang="en-US"/>
           </a:p>
@@ -1166,10 +1173,9 @@
           <a:lstStyle/>
           <a:p>
             <a:r>
-              <a:rPr lang="en-US" smtClean="0"/>
+              <a:rPr lang="en-US"/>
               <a:t>Click to edit Master title style</a:t>
             </a:r>
-            <a:endParaRPr lang="en-US"/>
           </a:p>
         </p:txBody>
       </p:sp>
@@ -1223,38 +1229,37 @@
           <a:p>
             <a:pPr lvl="0"/>
             <a:r>
-              <a:rPr lang="en-US" smtClean="0"/>
+              <a:rPr lang="en-US"/>
               <a:t>Click to edit Master text styles</a:t>
             </a:r>
           </a:p>
           <a:p>
             <a:pPr lvl="1"/>
             <a:r>
-              <a:rPr lang="en-US" smtClean="0"/>
+              <a:rPr lang="en-US"/>
               <a:t>Second level</a:t>
             </a:r>
           </a:p>
           <a:p>
             <a:pPr lvl="2"/>
             <a:r>
-              <a:rPr lang="en-US" smtClean="0"/>
+              <a:rPr lang="en-US"/>
               <a:t>Third level</a:t>
             </a:r>
           </a:p>
           <a:p>
             <a:pPr lvl="3"/>
             <a:r>
-              <a:rPr lang="en-US" smtClean="0"/>
+              <a:rPr lang="en-US"/>
               <a:t>Fourth level</a:t>
             </a:r>
           </a:p>
           <a:p>
             <a:pPr lvl="4"/>
             <a:r>
-              <a:rPr lang="en-US" smtClean="0"/>
+              <a:rPr lang="en-US"/>
               <a:t>Fifth level</a:t>
             </a:r>
-            <a:endParaRPr lang="en-US"/>
           </a:p>
         </p:txBody>
       </p:sp>
@@ -1308,38 +1313,37 @@
           <a:p>
             <a:pPr lvl="0"/>
             <a:r>
-              <a:rPr lang="en-US" smtClean="0"/>
+              <a:rPr lang="en-US"/>
               <a:t>Click to edit Master text styles</a:t>
             </a:r>
           </a:p>
           <a:p>
             <a:pPr lvl="1"/>
             <a:r>
-              <a:rPr lang="en-US" smtClean="0"/>
+              <a:rPr lang="en-US"/>
               <a:t>Second level</a:t>
             </a:r>
           </a:p>
           <a:p>
             <a:pPr lvl="2"/>
             <a:r>
-              <a:rPr lang="en-US" smtClean="0"/>
+              <a:rPr lang="en-US"/>
               <a:t>Third level</a:t>
             </a:r>
           </a:p>
           <a:p>
             <a:pPr lvl="3"/>
             <a:r>
-              <a:rPr lang="en-US" smtClean="0"/>
+              <a:rPr lang="en-US"/>
               <a:t>Fourth level</a:t>
             </a:r>
           </a:p>
           <a:p>
             <a:pPr lvl="4"/>
             <a:r>
-              <a:rPr lang="en-US" smtClean="0"/>
+              <a:rPr lang="en-US"/>
               <a:t>Fifth level</a:t>
             </a:r>
-            <a:endParaRPr lang="en-US"/>
           </a:p>
         </p:txBody>
       </p:sp>
@@ -1361,7 +1365,7 @@
             <a:fld id="{1D8BD707-D9CF-40AE-B4C6-C98DA3205C09}" type="datetimeFigureOut">
               <a:rPr lang="en-US" smtClean="0"/>
               <a:pPr/>
-              <a:t>8/1/2011</a:t>
+              <a:t>9/3/2025</a:t>
             </a:fld>
             <a:endParaRPr lang="en-US"/>
           </a:p>
@@ -1404,7 +1408,7 @@
             <a:fld id="{B6F15528-21DE-4FAA-801E-634DDDAF4B2B}" type="slidenum">
               <a:rPr lang="en-US" smtClean="0"/>
               <a:pPr/>
-              <a:t>‹#›</a:t>
+              <a:t>‹Nº›</a:t>
             </a:fld>
             <a:endParaRPr lang="en-US"/>
           </a:p>
@@ -1455,10 +1459,9 @@
           </a:lstStyle>
           <a:p>
             <a:r>
-              <a:rPr lang="en-US" smtClean="0"/>
+              <a:rPr lang="en-US"/>
               <a:t>Click to edit Master title style</a:t>
             </a:r>
-            <a:endParaRPr lang="en-US"/>
           </a:p>
         </p:txBody>
       </p:sp>
@@ -1521,7 +1524,7 @@
           <a:p>
             <a:pPr lvl="0"/>
             <a:r>
-              <a:rPr lang="en-US" smtClean="0"/>
+              <a:rPr lang="en-US"/>
               <a:t>Click to edit Master text styles</a:t>
             </a:r>
           </a:p>
@@ -1577,38 +1580,37 @@
           <a:p>
             <a:pPr lvl="0"/>
             <a:r>
-              <a:rPr lang="en-US" smtClean="0"/>
+              <a:rPr lang="en-US"/>
               <a:t>Click to edit Master text styles</a:t>
             </a:r>
           </a:p>
           <a:p>
             <a:pPr lvl="1"/>
             <a:r>
-              <a:rPr lang="en-US" smtClean="0"/>
+              <a:rPr lang="en-US"/>
               <a:t>Second level</a:t>
             </a:r>
           </a:p>
           <a:p>
             <a:pPr lvl="2"/>
             <a:r>
-              <a:rPr lang="en-US" smtClean="0"/>
+              <a:rPr lang="en-US"/>
               <a:t>Third level</a:t>
             </a:r>
           </a:p>
           <a:p>
             <a:pPr lvl="3"/>
             <a:r>
-              <a:rPr lang="en-US" smtClean="0"/>
+              <a:rPr lang="en-US"/>
               <a:t>Fourth level</a:t>
             </a:r>
           </a:p>
           <a:p>
             <a:pPr lvl="4"/>
             <a:r>
-              <a:rPr lang="en-US" smtClean="0"/>
+              <a:rPr lang="en-US"/>
               <a:t>Fifth level</a:t>
             </a:r>
-            <a:endParaRPr lang="en-US"/>
           </a:p>
         </p:txBody>
       </p:sp>
@@ -1671,7 +1673,7 @@
           <a:p>
             <a:pPr lvl="0"/>
             <a:r>
-              <a:rPr lang="en-US" smtClean="0"/>
+              <a:rPr lang="en-US"/>
               <a:t>Click to edit Master text styles</a:t>
             </a:r>
           </a:p>
@@ -1727,38 +1729,37 @@
           <a:p>
             <a:pPr lvl="0"/>
             <a:r>
-              <a:rPr lang="en-US" smtClean="0"/>
+              <a:rPr lang="en-US"/>
               <a:t>Click to edit Master text styles</a:t>
             </a:r>
           </a:p>
           <a:p>
             <a:pPr lvl="1"/>
             <a:r>
-              <a:rPr lang="en-US" smtClean="0"/>
+              <a:rPr lang="en-US"/>
               <a:t>Second level</a:t>
             </a:r>
           </a:p>
           <a:p>
             <a:pPr lvl="2"/>
             <a:r>
-              <a:rPr lang="en-US" smtClean="0"/>
+              <a:rPr lang="en-US"/>
               <a:t>Third level</a:t>
             </a:r>
           </a:p>
           <a:p>
             <a:pPr lvl="3"/>
             <a:r>
-              <a:rPr lang="en-US" smtClean="0"/>
+              <a:rPr lang="en-US"/>
               <a:t>Fourth level</a:t>
             </a:r>
           </a:p>
           <a:p>
             <a:pPr lvl="4"/>
             <a:r>
-              <a:rPr lang="en-US" smtClean="0"/>
+              <a:rPr lang="en-US"/>
               <a:t>Fifth level</a:t>
             </a:r>
-            <a:endParaRPr lang="en-US"/>
           </a:p>
         </p:txBody>
       </p:sp>
@@ -1780,7 +1781,7 @@
             <a:fld id="{1D8BD707-D9CF-40AE-B4C6-C98DA3205C09}" type="datetimeFigureOut">
               <a:rPr lang="en-US" smtClean="0"/>
               <a:pPr/>
-              <a:t>8/1/2011</a:t>
+              <a:t>9/3/2025</a:t>
             </a:fld>
             <a:endParaRPr lang="en-US"/>
           </a:p>
@@ -1823,7 +1824,7 @@
             <a:fld id="{B6F15528-21DE-4FAA-801E-634DDDAF4B2B}" type="slidenum">
               <a:rPr lang="en-US" smtClean="0"/>
               <a:pPr/>
-              <a:t>‹#›</a:t>
+              <a:t>‹Nº›</a:t>
             </a:fld>
             <a:endParaRPr lang="en-US"/>
           </a:p>
@@ -1870,10 +1871,9 @@
           <a:lstStyle/>
           <a:p>
             <a:r>
-              <a:rPr lang="en-US" smtClean="0"/>
+              <a:rPr lang="en-US"/>
               <a:t>Click to edit Master title style</a:t>
             </a:r>
-            <a:endParaRPr lang="en-US"/>
           </a:p>
         </p:txBody>
       </p:sp>
@@ -1895,7 +1895,7 @@
             <a:fld id="{1D8BD707-D9CF-40AE-B4C6-C98DA3205C09}" type="datetimeFigureOut">
               <a:rPr lang="en-US" smtClean="0"/>
               <a:pPr/>
-              <a:t>8/1/2011</a:t>
+              <a:t>9/3/2025</a:t>
             </a:fld>
             <a:endParaRPr lang="en-US"/>
           </a:p>
@@ -1938,7 +1938,7 @@
             <a:fld id="{B6F15528-21DE-4FAA-801E-634DDDAF4B2B}" type="slidenum">
               <a:rPr lang="en-US" smtClean="0"/>
               <a:pPr/>
-              <a:t>‹#›</a:t>
+              <a:t>‹Nº›</a:t>
             </a:fld>
             <a:endParaRPr lang="en-US"/>
           </a:p>
@@ -1987,7 +1987,7 @@
             <a:fld id="{1D8BD707-D9CF-40AE-B4C6-C98DA3205C09}" type="datetimeFigureOut">
               <a:rPr lang="en-US" smtClean="0"/>
               <a:pPr/>
-              <a:t>8/1/2011</a:t>
+              <a:t>9/3/2025</a:t>
             </a:fld>
             <a:endParaRPr lang="en-US"/>
           </a:p>
@@ -2030,7 +2030,7 @@
             <a:fld id="{B6F15528-21DE-4FAA-801E-634DDDAF4B2B}" type="slidenum">
               <a:rPr lang="en-US" smtClean="0"/>
               <a:pPr/>
-              <a:t>‹#›</a:t>
+              <a:t>‹Nº›</a:t>
             </a:fld>
             <a:endParaRPr lang="en-US"/>
           </a:p>
@@ -2086,10 +2086,9 @@
           </a:lstStyle>
           <a:p>
             <a:r>
-              <a:rPr lang="en-US" smtClean="0"/>
+              <a:rPr lang="en-US"/>
               <a:t>Click to edit Master title style</a:t>
             </a:r>
-            <a:endParaRPr lang="en-US"/>
           </a:p>
         </p:txBody>
       </p:sp>
@@ -2143,38 +2142,37 @@
           <a:p>
             <a:pPr lvl="0"/>
             <a:r>
-              <a:rPr lang="en-US" smtClean="0"/>
+              <a:rPr lang="en-US"/>
               <a:t>Click to edit Master text styles</a:t>
             </a:r>
           </a:p>
           <a:p>
             <a:pPr lvl="1"/>
             <a:r>
-              <a:rPr lang="en-US" smtClean="0"/>
+              <a:rPr lang="en-US"/>
               <a:t>Second level</a:t>
             </a:r>
           </a:p>
           <a:p>
             <a:pPr lvl="2"/>
             <a:r>
-              <a:rPr lang="en-US" smtClean="0"/>
+              <a:rPr lang="en-US"/>
               <a:t>Third level</a:t>
             </a:r>
           </a:p>
           <a:p>
             <a:pPr lvl="3"/>
             <a:r>
-              <a:rPr lang="en-US" smtClean="0"/>
+              <a:rPr lang="en-US"/>
               <a:t>Fourth level</a:t>
             </a:r>
           </a:p>
           <a:p>
             <a:pPr lvl="4"/>
             <a:r>
-              <a:rPr lang="en-US" smtClean="0"/>
+              <a:rPr lang="en-US"/>
               <a:t>Fifth level</a:t>
             </a:r>
-            <a:endParaRPr lang="en-US"/>
           </a:p>
         </p:txBody>
       </p:sp>
@@ -2237,7 +2235,7 @@
           <a:p>
             <a:pPr lvl="0"/>
             <a:r>
-              <a:rPr lang="en-US" smtClean="0"/>
+              <a:rPr lang="en-US"/>
               <a:t>Click to edit Master text styles</a:t>
             </a:r>
           </a:p>
@@ -2261,7 +2259,7 @@
             <a:fld id="{1D8BD707-D9CF-40AE-B4C6-C98DA3205C09}" type="datetimeFigureOut">
               <a:rPr lang="en-US" smtClean="0"/>
               <a:pPr/>
-              <a:t>8/1/2011</a:t>
+              <a:t>9/3/2025</a:t>
             </a:fld>
             <a:endParaRPr lang="en-US"/>
           </a:p>
@@ -2304,7 +2302,7 @@
             <a:fld id="{B6F15528-21DE-4FAA-801E-634DDDAF4B2B}" type="slidenum">
               <a:rPr lang="en-US" smtClean="0"/>
               <a:pPr/>
-              <a:t>‹#›</a:t>
+              <a:t>‹Nº›</a:t>
             </a:fld>
             <a:endParaRPr lang="en-US"/>
           </a:p>
@@ -2360,10 +2358,9 @@
           </a:lstStyle>
           <a:p>
             <a:r>
-              <a:rPr lang="en-US" smtClean="0"/>
+              <a:rPr lang="en-US"/>
               <a:t>Click to edit Master title style</a:t>
             </a:r>
-            <a:endParaRPr lang="en-US"/>
           </a:p>
         </p:txBody>
       </p:sp>
@@ -2487,7 +2484,7 @@
           <a:p>
             <a:pPr lvl="0"/>
             <a:r>
-              <a:rPr lang="en-US" smtClean="0"/>
+              <a:rPr lang="en-US"/>
               <a:t>Click to edit Master text styles</a:t>
             </a:r>
           </a:p>
@@ -2511,7 +2508,7 @@
             <a:fld id="{1D8BD707-D9CF-40AE-B4C6-C98DA3205C09}" type="datetimeFigureOut">
               <a:rPr lang="en-US" smtClean="0"/>
               <a:pPr/>
-              <a:t>8/1/2011</a:t>
+              <a:t>9/3/2025</a:t>
             </a:fld>
             <a:endParaRPr lang="en-US"/>
           </a:p>
@@ -2554,7 +2551,7 @@
             <a:fld id="{B6F15528-21DE-4FAA-801E-634DDDAF4B2B}" type="slidenum">
               <a:rPr lang="en-US" smtClean="0"/>
               <a:pPr/>
-              <a:t>‹#›</a:t>
+              <a:t>‹Nº›</a:t>
             </a:fld>
             <a:endParaRPr lang="en-US"/>
           </a:p>
@@ -2616,10 +2613,9 @@
           <a:lstStyle/>
           <a:p>
             <a:r>
-              <a:rPr lang="en-US" smtClean="0"/>
+              <a:rPr lang="en-US"/>
               <a:t>Click to edit Master title style</a:t>
             </a:r>
-            <a:endParaRPr lang="en-US"/>
           </a:p>
         </p:txBody>
       </p:sp>
@@ -2650,38 +2646,37 @@
           <a:p>
             <a:pPr lvl="0"/>
             <a:r>
-              <a:rPr lang="en-US" smtClean="0"/>
+              <a:rPr lang="en-US"/>
               <a:t>Click to edit Master text styles</a:t>
             </a:r>
           </a:p>
           <a:p>
             <a:pPr lvl="1"/>
             <a:r>
-              <a:rPr lang="en-US" smtClean="0"/>
+              <a:rPr lang="en-US"/>
               <a:t>Second level</a:t>
             </a:r>
           </a:p>
           <a:p>
             <a:pPr lvl="2"/>
             <a:r>
-              <a:rPr lang="en-US" smtClean="0"/>
+              <a:rPr lang="en-US"/>
               <a:t>Third level</a:t>
             </a:r>
           </a:p>
           <a:p>
             <a:pPr lvl="3"/>
             <a:r>
-              <a:rPr lang="en-US" smtClean="0"/>
+              <a:rPr lang="en-US"/>
               <a:t>Fourth level</a:t>
             </a:r>
           </a:p>
           <a:p>
             <a:pPr lvl="4"/>
             <a:r>
-              <a:rPr lang="en-US" smtClean="0"/>
+              <a:rPr lang="en-US"/>
               <a:t>Fifth level</a:t>
             </a:r>
-            <a:endParaRPr lang="en-US"/>
           </a:p>
         </p:txBody>
       </p:sp>
@@ -2721,7 +2716,7 @@
             <a:fld id="{1D8BD707-D9CF-40AE-B4C6-C98DA3205C09}" type="datetimeFigureOut">
               <a:rPr lang="en-US" smtClean="0"/>
               <a:pPr/>
-              <a:t>8/1/2011</a:t>
+              <a:t>9/3/2025</a:t>
             </a:fld>
             <a:endParaRPr lang="en-US"/>
           </a:p>
@@ -2800,7 +2795,7 @@
             <a:fld id="{B6F15528-21DE-4FAA-801E-634DDDAF4B2B}" type="slidenum">
               <a:rPr lang="en-US" smtClean="0"/>
               <a:pPr/>
-              <a:t>‹#›</a:t>
+              <a:t>‹Nº›</a:t>
             </a:fld>
             <a:endParaRPr lang="en-US"/>
           </a:p>
@@ -3076,7 +3071,7 @@
 </file>
 
 <file path=ppt/slides/slide1.xml><?xml version="1.0" encoding="utf-8"?>
-<p:sld xmlns:p="http://schemas.openxmlformats.org/presentationml/2006/main" xmlns:a="http://schemas.openxmlformats.org/drawingml/2006/main" xmlns:r="http://schemas.openxmlformats.org/officeDocument/2006/relationships">
+<p:sld xmlns:a="http://schemas.openxmlformats.org/drawingml/2006/main" xmlns:r="http://schemas.openxmlformats.org/officeDocument/2006/relationships" xmlns:p="http://schemas.openxmlformats.org/presentationml/2006/main">
   <p:cSld>
     <p:spTree>
       <p:nvGrpSpPr>
@@ -3094,14 +3089,14 @@
       </p:grpSpPr>
       <p:grpSp>
         <p:nvGrpSpPr>
-          <p:cNvPr name="Group 2" id="2"/>
+          <p:cNvPr id="2" name="Group 2"/>
           <p:cNvGrpSpPr>
-            <a:grpSpLocks noChangeAspect="true"/>
+            <a:grpSpLocks noChangeAspect="1"/>
           </p:cNvGrpSpPr>
           <p:nvPr/>
         </p:nvGrpSpPr>
         <p:grpSpPr>
-          <a:xfrm rot="0">
+          <a:xfrm>
             <a:off x="0" y="0"/>
             <a:ext cx="10287041" cy="10287000"/>
             <a:chOff x="0" y="0"/>
@@ -3110,12 +3105,12 @@
         </p:grpSpPr>
         <p:sp>
           <p:nvSpPr>
-            <p:cNvPr name="Freeform 3" id="3"/>
+            <p:cNvPr id="3" name="Freeform 3"/>
             <p:cNvSpPr/>
             <p:nvPr/>
           </p:nvSpPr>
           <p:spPr>
-            <a:xfrm flipH="false" flipV="false" rot="0">
+            <a:xfrm>
               <a:off x="0" y="0"/>
               <a:ext cx="6350026" cy="6350000"/>
             </a:xfrm>
@@ -3124,9 +3119,9 @@
               <a:gdLst/>
               <a:ahLst/>
               <a:cxnLst/>
-              <a:rect r="r" b="b" t="t" l="l"/>
+              <a:rect l="l" t="t" r="r" b="b"/>
               <a:pathLst>
-                <a:path h="6350000" w="6350026">
+                <a:path w="6350026" h="6350000">
                   <a:moveTo>
                     <a:pt x="0" y="0"/>
                   </a:moveTo>
@@ -3146,20 +3141,27 @@
             <a:blipFill>
               <a:blip r:embed="rId2"/>
               <a:stretch>
-                <a:fillRect l="-38691" t="0" r="-38691" b="0"/>
+                <a:fillRect l="-38691" r="-38691"/>
               </a:stretch>
             </a:blipFill>
           </p:spPr>
+          <p:txBody>
+            <a:bodyPr/>
+            <a:lstStyle/>
+            <a:p>
+              <a:endParaRPr lang="es-CL"/>
+            </a:p>
+          </p:txBody>
         </p:sp>
       </p:grpSp>
       <p:grpSp>
         <p:nvGrpSpPr>
-          <p:cNvPr name="Group 4" id="4"/>
+          <p:cNvPr id="4" name="Group 4"/>
           <p:cNvGrpSpPr/>
           <p:nvPr/>
         </p:nvGrpSpPr>
         <p:grpSpPr>
-          <a:xfrm rot="0">
+          <a:xfrm>
             <a:off x="4946497" y="3085149"/>
             <a:ext cx="12312803" cy="4116702"/>
             <a:chOff x="0" y="0"/>
@@ -3168,12 +3170,12 @@
         </p:grpSpPr>
         <p:sp>
           <p:nvSpPr>
-            <p:cNvPr name="Freeform 5" id="5"/>
+            <p:cNvPr id="5" name="Freeform 5"/>
             <p:cNvSpPr/>
             <p:nvPr/>
           </p:nvSpPr>
           <p:spPr>
-            <a:xfrm flipH="false" flipV="false" rot="0">
+            <a:xfrm>
               <a:off x="0" y="0"/>
               <a:ext cx="4491744" cy="1501784"/>
             </a:xfrm>
@@ -3182,9 +3184,9 @@
               <a:gdLst/>
               <a:ahLst/>
               <a:cxnLst/>
-              <a:rect r="r" b="b" t="t" l="l"/>
+              <a:rect l="l" t="t" r="r" b="b"/>
               <a:pathLst>
-                <a:path h="1501784" w="4491744">
+                <a:path w="4491744" h="1501784">
                   <a:moveTo>
                     <a:pt x="0" y="0"/>
                   </a:moveTo>
@@ -3205,16 +3207,23 @@
               <a:srgbClr val="FFFFFF"/>
             </a:solidFill>
           </p:spPr>
+          <p:txBody>
+            <a:bodyPr/>
+            <a:lstStyle/>
+            <a:p>
+              <a:endParaRPr lang="es-CL"/>
+            </a:p>
+          </p:txBody>
         </p:sp>
       </p:grpSp>
       <p:sp>
         <p:nvSpPr>
-          <p:cNvPr name="TextBox 6" id="6"/>
-          <p:cNvSpPr txBox="true"/>
+          <p:cNvPr id="6" name="TextBox 6"/>
+          <p:cNvSpPr txBox="1"/>
           <p:nvPr/>
         </p:nvSpPr>
         <p:spPr>
-          <a:xfrm rot="0">
+          <a:xfrm>
             <a:off x="4946497" y="4299661"/>
             <a:ext cx="11579363" cy="1530266"/>
           </a:xfrm>
@@ -3223,7 +3232,7 @@
           </a:prstGeom>
         </p:spPr>
         <p:txBody>
-          <a:bodyPr anchor="t" rtlCol="false" tIns="0" lIns="0" bIns="0" rIns="0">
+          <a:bodyPr lIns="0" tIns="0" rIns="0" bIns="0" rtlCol="0" anchor="t">
             <a:spAutoFit/>
           </a:bodyPr>
           <a:lstStyle/>
@@ -3234,7 +3243,7 @@
               </a:lnSpc>
             </a:pPr>
             <a:r>
-              <a:rPr lang="en-US" sz="4391" b="true">
+              <a:rPr lang="en-US" sz="4391" b="1">
                 <a:solidFill>
                   <a:srgbClr val="000000"/>
                 </a:solidFill>
@@ -3250,12 +3259,12 @@
       </p:sp>
       <p:sp>
         <p:nvSpPr>
-          <p:cNvPr name="TextBox 7" id="7"/>
-          <p:cNvSpPr txBox="true"/>
+          <p:cNvPr id="7" name="TextBox 7"/>
+          <p:cNvSpPr txBox="1"/>
           <p:nvPr/>
         </p:nvSpPr>
         <p:spPr>
-          <a:xfrm rot="0">
+          <a:xfrm>
             <a:off x="5493069" y="3297295"/>
             <a:ext cx="8663893" cy="638033"/>
           </a:xfrm>
@@ -3264,7 +3273,7 @@
           </a:prstGeom>
         </p:spPr>
         <p:txBody>
-          <a:bodyPr anchor="t" rtlCol="false" tIns="0" lIns="0" bIns="0" rIns="0">
+          <a:bodyPr lIns="0" tIns="0" rIns="0" bIns="0" rtlCol="0" anchor="t">
             <a:spAutoFit/>
           </a:bodyPr>
           <a:lstStyle/>
@@ -3275,7 +3284,7 @@
               </a:lnSpc>
             </a:pPr>
             <a:r>
-              <a:rPr lang="en-US" sz="3755" b="true">
+              <a:rPr lang="en-US" sz="3755" b="1">
                 <a:solidFill>
                   <a:srgbClr val="000000"/>
                 </a:solidFill>
@@ -3291,12 +3300,12 @@
       </p:sp>
       <p:sp>
         <p:nvSpPr>
-          <p:cNvPr name="TextBox 8" id="8"/>
-          <p:cNvSpPr txBox="true"/>
+          <p:cNvPr id="8" name="TextBox 8"/>
+          <p:cNvSpPr txBox="1"/>
           <p:nvPr/>
         </p:nvSpPr>
         <p:spPr>
-          <a:xfrm rot="0">
+          <a:xfrm>
             <a:off x="10457968" y="7044051"/>
             <a:ext cx="7031151" cy="2734375"/>
           </a:xfrm>
@@ -3305,7 +3314,7 @@
           </a:prstGeom>
         </p:spPr>
         <p:txBody>
-          <a:bodyPr anchor="t" rtlCol="false" tIns="0" lIns="0" bIns="0" rIns="0">
+          <a:bodyPr lIns="0" tIns="0" rIns="0" bIns="0" rtlCol="0" anchor="t">
             <a:spAutoFit/>
           </a:bodyPr>
           <a:lstStyle/>
@@ -3434,7 +3443,7 @@
 </file>
 
 <file path=ppt/slides/slide2.xml><?xml version="1.0" encoding="utf-8"?>
-<p:sld xmlns:p="http://schemas.openxmlformats.org/presentationml/2006/main" xmlns:a="http://schemas.openxmlformats.org/drawingml/2006/main" xmlns:r="http://schemas.openxmlformats.org/officeDocument/2006/relationships">
+<p:sld xmlns:a="http://schemas.openxmlformats.org/drawingml/2006/main" xmlns:r="http://schemas.openxmlformats.org/officeDocument/2006/relationships" xmlns:p="http://schemas.openxmlformats.org/presentationml/2006/main">
   <p:cSld>
     <p:spTree>
       <p:nvGrpSpPr>
@@ -3452,12 +3461,12 @@
       </p:grpSpPr>
       <p:grpSp>
         <p:nvGrpSpPr>
-          <p:cNvPr name="Group 2" id="2"/>
+          <p:cNvPr id="2" name="Group 2"/>
           <p:cNvGrpSpPr/>
           <p:nvPr/>
         </p:nvGrpSpPr>
         <p:grpSpPr>
-          <a:xfrm rot="0">
+          <a:xfrm>
             <a:off x="14923220" y="0"/>
             <a:ext cx="3364780" cy="10287000"/>
             <a:chOff x="0" y="0"/>
@@ -3466,12 +3475,12 @@
         </p:grpSpPr>
         <p:sp>
           <p:nvSpPr>
-            <p:cNvPr name="Freeform 3" id="3"/>
+            <p:cNvPr id="3" name="Freeform 3"/>
             <p:cNvSpPr/>
             <p:nvPr/>
           </p:nvSpPr>
           <p:spPr>
-            <a:xfrm flipH="false" flipV="false" rot="0">
+            <a:xfrm>
               <a:off x="0" y="0"/>
               <a:ext cx="626015" cy="1913890"/>
             </a:xfrm>
@@ -3480,9 +3489,9 @@
               <a:gdLst/>
               <a:ahLst/>
               <a:cxnLst/>
-              <a:rect r="r" b="b" t="t" l="l"/>
+              <a:rect l="l" t="t" r="r" b="b"/>
               <a:pathLst>
-                <a:path h="1913890" w="626015">
+                <a:path w="626015" h="1913890">
                   <a:moveTo>
                     <a:pt x="0" y="0"/>
                   </a:moveTo>
@@ -3503,16 +3512,23 @@
               <a:srgbClr val="36528B"/>
             </a:solidFill>
           </p:spPr>
+          <p:txBody>
+            <a:bodyPr/>
+            <a:lstStyle/>
+            <a:p>
+              <a:endParaRPr lang="es-CL"/>
+            </a:p>
+          </p:txBody>
         </p:sp>
       </p:grpSp>
       <p:sp>
         <p:nvSpPr>
-          <p:cNvPr name="Freeform 4" id="4"/>
+          <p:cNvPr id="4" name="Freeform 4"/>
           <p:cNvSpPr/>
           <p:nvPr/>
         </p:nvSpPr>
         <p:spPr>
-          <a:xfrm flipH="false" flipV="false" rot="0">
+          <a:xfrm>
             <a:off x="9328883" y="2386086"/>
             <a:ext cx="8313397" cy="5514828"/>
           </a:xfrm>
@@ -3521,9 +3537,9 @@
             <a:gdLst/>
             <a:ahLst/>
             <a:cxnLst/>
-            <a:rect r="r" b="b" t="t" l="l"/>
+            <a:rect l="l" t="t" r="r" b="b"/>
             <a:pathLst>
-              <a:path h="5514828" w="8313397">
+              <a:path w="8313397" h="5514828">
                 <a:moveTo>
                   <a:pt x="0" y="0"/>
                 </a:moveTo>
@@ -3546,19 +3562,26 @@
           <a:blipFill>
             <a:blip r:embed="rId2"/>
             <a:stretch>
-              <a:fillRect l="0" t="0" r="0" b="0"/>
+              <a:fillRect/>
             </a:stretch>
           </a:blipFill>
         </p:spPr>
-      </p:sp>
-      <p:sp>
-        <p:nvSpPr>
-          <p:cNvPr name="TextBox 5" id="5"/>
-          <p:cNvSpPr txBox="true"/>
+        <p:txBody>
+          <a:bodyPr/>
+          <a:lstStyle/>
+          <a:p>
+            <a:endParaRPr lang="es-CL"/>
+          </a:p>
+        </p:txBody>
+      </p:sp>
+      <p:sp>
+        <p:nvSpPr>
+          <p:cNvPr id="5" name="TextBox 5"/>
+          <p:cNvSpPr txBox="1"/>
           <p:nvPr/>
         </p:nvSpPr>
         <p:spPr>
-          <a:xfrm rot="0">
+          <a:xfrm>
             <a:off x="779229" y="3646228"/>
             <a:ext cx="7744599" cy="4832452"/>
           </a:xfrm>
@@ -3567,12 +3590,12 @@
           </a:prstGeom>
         </p:spPr>
         <p:txBody>
-          <a:bodyPr anchor="t" rtlCol="false" tIns="0" lIns="0" bIns="0" rIns="0">
+          <a:bodyPr lIns="0" tIns="0" rIns="0" bIns="0" rtlCol="0" anchor="t">
             <a:spAutoFit/>
           </a:bodyPr>
           <a:lstStyle/>
           <a:p>
-            <a:pPr algn="l" marL="501096" indent="-250548" lvl="1">
+            <a:pPr marL="501096" lvl="1" indent="-250548" algn="l">
               <a:lnSpc>
                 <a:spcPts val="3249"/>
               </a:lnSpc>
@@ -3598,9 +3621,18 @@
                 <a:spcPts val="3249"/>
               </a:lnSpc>
             </a:pPr>
-          </a:p>
-          <a:p>
-            <a:pPr algn="l" marL="501096" indent="-250548" lvl="1">
+            <a:endParaRPr lang="en-US" sz="2320">
+              <a:solidFill>
+                <a:srgbClr val="000000"/>
+              </a:solidFill>
+              <a:latin typeface="Montserrat"/>
+              <a:ea typeface="Montserrat"/>
+              <a:cs typeface="Montserrat"/>
+              <a:sym typeface="Montserrat"/>
+            </a:endParaRPr>
+          </a:p>
+          <a:p>
+            <a:pPr marL="501096" lvl="1" indent="-250548" algn="l">
               <a:lnSpc>
                 <a:spcPts val="3249"/>
               </a:lnSpc>
@@ -3626,9 +3658,18 @@
                 <a:spcPts val="3249"/>
               </a:lnSpc>
             </a:pPr>
-          </a:p>
-          <a:p>
-            <a:pPr algn="l" marL="501096" indent="-250548" lvl="1">
+            <a:endParaRPr lang="en-US" sz="2320">
+              <a:solidFill>
+                <a:srgbClr val="000000"/>
+              </a:solidFill>
+              <a:latin typeface="Montserrat"/>
+              <a:ea typeface="Montserrat"/>
+              <a:cs typeface="Montserrat"/>
+              <a:sym typeface="Montserrat"/>
+            </a:endParaRPr>
+          </a:p>
+          <a:p>
+            <a:pPr marL="501096" lvl="1" indent="-250548" algn="l">
               <a:lnSpc>
                 <a:spcPts val="3249"/>
               </a:lnSpc>
@@ -3654,17 +3695,26 @@
                 <a:spcPts val="2689"/>
               </a:lnSpc>
             </a:pPr>
-          </a:p>
-        </p:txBody>
-      </p:sp>
-      <p:sp>
-        <p:nvSpPr>
-          <p:cNvPr name="TextBox 6" id="6"/>
-          <p:cNvSpPr txBox="true"/>
+            <a:endParaRPr lang="en-US" sz="2320">
+              <a:solidFill>
+                <a:srgbClr val="000000"/>
+              </a:solidFill>
+              <a:latin typeface="Montserrat"/>
+              <a:ea typeface="Montserrat"/>
+              <a:cs typeface="Montserrat"/>
+              <a:sym typeface="Montserrat"/>
+            </a:endParaRPr>
+          </a:p>
+        </p:txBody>
+      </p:sp>
+      <p:sp>
+        <p:nvSpPr>
+          <p:cNvPr id="6" name="TextBox 6"/>
+          <p:cNvSpPr txBox="1"/>
           <p:nvPr/>
         </p:nvSpPr>
         <p:spPr>
-          <a:xfrm rot="0">
+          <a:xfrm>
             <a:off x="1028700" y="580362"/>
             <a:ext cx="9544796" cy="1170794"/>
           </a:xfrm>
@@ -3673,7 +3723,7 @@
           </a:prstGeom>
         </p:spPr>
         <p:txBody>
-          <a:bodyPr anchor="t" rtlCol="false" tIns="0" lIns="0" bIns="0" rIns="0">
+          <a:bodyPr lIns="0" tIns="0" rIns="0" bIns="0" rtlCol="0" anchor="t">
             <a:spAutoFit/>
           </a:bodyPr>
           <a:lstStyle/>
@@ -3684,7 +3734,7 @@
               </a:lnSpc>
             </a:pPr>
             <a:r>
-              <a:rPr lang="en-US" b="true" sz="6300">
+              <a:rPr lang="en-US" sz="6300" b="1">
                 <a:solidFill>
                   <a:srgbClr val="000000"/>
                 </a:solidFill>
@@ -3700,12 +3750,12 @@
       </p:sp>
       <p:sp>
         <p:nvSpPr>
-          <p:cNvPr name="TextBox 7" id="7"/>
-          <p:cNvSpPr txBox="true"/>
+          <p:cNvPr id="7" name="TextBox 7"/>
+          <p:cNvSpPr txBox="1"/>
           <p:nvPr/>
         </p:nvSpPr>
         <p:spPr>
-          <a:xfrm rot="0">
+          <a:xfrm>
             <a:off x="9139238" y="4819967"/>
             <a:ext cx="9525" cy="580390"/>
           </a:xfrm>
@@ -3714,7 +3764,7 @@
           </a:prstGeom>
         </p:spPr>
         <p:txBody>
-          <a:bodyPr anchor="t" rtlCol="false" tIns="0" lIns="0" bIns="0" rIns="0">
+          <a:bodyPr lIns="0" tIns="0" rIns="0" bIns="0" rtlCol="0" anchor="t">
             <a:spAutoFit/>
           </a:bodyPr>
           <a:lstStyle/>
@@ -3724,17 +3774,18 @@
                 <a:spcPts val="4759"/>
               </a:lnSpc>
             </a:pPr>
-          </a:p>
-        </p:txBody>
-      </p:sp>
-      <p:sp>
-        <p:nvSpPr>
-          <p:cNvPr name="TextBox 8" id="8"/>
-          <p:cNvSpPr txBox="true"/>
+            <a:endParaRPr/>
+          </a:p>
+        </p:txBody>
+      </p:sp>
+      <p:sp>
+        <p:nvSpPr>
+          <p:cNvPr id="8" name="TextBox 8"/>
+          <p:cNvSpPr txBox="1"/>
           <p:nvPr/>
         </p:nvSpPr>
         <p:spPr>
-          <a:xfrm rot="0">
+          <a:xfrm>
             <a:off x="1028700" y="2398954"/>
             <a:ext cx="4829175" cy="481430"/>
           </a:xfrm>
@@ -3743,7 +3794,7 @@
           </a:prstGeom>
         </p:spPr>
         <p:txBody>
-          <a:bodyPr anchor="t" rtlCol="false" tIns="0" lIns="0" bIns="0" rIns="0">
+          <a:bodyPr lIns="0" tIns="0" rIns="0" bIns="0" rtlCol="0" anchor="t">
             <a:spAutoFit/>
           </a:bodyPr>
           <a:lstStyle/>
@@ -3754,7 +3805,7 @@
               </a:lnSpc>
             </a:pPr>
             <a:r>
-              <a:rPr lang="en-US" sz="2796" b="true">
+              <a:rPr lang="en-US" sz="2796" b="1">
                 <a:solidFill>
                   <a:srgbClr val="000000"/>
                 </a:solidFill>
@@ -3777,7 +3828,7 @@
 </file>
 
 <file path=ppt/slides/slide3.xml><?xml version="1.0" encoding="utf-8"?>
-<p:sld xmlns:p="http://schemas.openxmlformats.org/presentationml/2006/main" xmlns:a="http://schemas.openxmlformats.org/drawingml/2006/main" xmlns:r="http://schemas.openxmlformats.org/officeDocument/2006/relationships">
+<p:sld xmlns:a="http://schemas.openxmlformats.org/drawingml/2006/main" xmlns:r="http://schemas.openxmlformats.org/officeDocument/2006/relationships" xmlns:p="http://schemas.openxmlformats.org/presentationml/2006/main">
   <p:cSld>
     <p:spTree>
       <p:nvGrpSpPr>
@@ -3795,12 +3846,12 @@
       </p:grpSpPr>
       <p:grpSp>
         <p:nvGrpSpPr>
-          <p:cNvPr name="Group 2" id="2"/>
+          <p:cNvPr id="2" name="Group 2"/>
           <p:cNvGrpSpPr/>
           <p:nvPr/>
         </p:nvGrpSpPr>
         <p:grpSpPr>
-          <a:xfrm rot="0">
+          <a:xfrm>
             <a:off x="0" y="0"/>
             <a:ext cx="3364780" cy="10287000"/>
             <a:chOff x="0" y="0"/>
@@ -3809,12 +3860,12 @@
         </p:grpSpPr>
         <p:sp>
           <p:nvSpPr>
-            <p:cNvPr name="Freeform 3" id="3"/>
+            <p:cNvPr id="3" name="Freeform 3"/>
             <p:cNvSpPr/>
             <p:nvPr/>
           </p:nvSpPr>
           <p:spPr>
-            <a:xfrm flipH="false" flipV="false" rot="0">
+            <a:xfrm>
               <a:off x="0" y="0"/>
               <a:ext cx="626015" cy="1913890"/>
             </a:xfrm>
@@ -3823,9 +3874,9 @@
               <a:gdLst/>
               <a:ahLst/>
               <a:cxnLst/>
-              <a:rect r="r" b="b" t="t" l="l"/>
+              <a:rect l="l" t="t" r="r" b="b"/>
               <a:pathLst>
-                <a:path h="1913890" w="626015">
+                <a:path w="626015" h="1913890">
                   <a:moveTo>
                     <a:pt x="0" y="0"/>
                   </a:moveTo>
@@ -3846,16 +3897,23 @@
               <a:srgbClr val="FFBD59"/>
             </a:solidFill>
           </p:spPr>
+          <p:txBody>
+            <a:bodyPr/>
+            <a:lstStyle/>
+            <a:p>
+              <a:endParaRPr lang="es-CL"/>
+            </a:p>
+          </p:txBody>
         </p:sp>
       </p:grpSp>
       <p:sp>
         <p:nvSpPr>
-          <p:cNvPr name="Freeform 4" id="4"/>
+          <p:cNvPr id="4" name="Freeform 4"/>
           <p:cNvSpPr/>
           <p:nvPr/>
         </p:nvSpPr>
         <p:spPr>
-          <a:xfrm flipH="false" flipV="false" rot="0">
+          <a:xfrm>
             <a:off x="574883" y="2726829"/>
             <a:ext cx="7240962" cy="4833342"/>
           </a:xfrm>
@@ -3864,9 +3922,9 @@
             <a:gdLst/>
             <a:ahLst/>
             <a:cxnLst/>
-            <a:rect r="r" b="b" t="t" l="l"/>
+            <a:rect l="l" t="t" r="r" b="b"/>
             <a:pathLst>
-              <a:path h="4833342" w="7240962">
+              <a:path w="7240962" h="4833342">
                 <a:moveTo>
                   <a:pt x="0" y="0"/>
                 </a:moveTo>
@@ -3889,19 +3947,26 @@
           <a:blipFill>
             <a:blip r:embed="rId2"/>
             <a:stretch>
-              <a:fillRect l="0" t="0" r="0" b="0"/>
+              <a:fillRect/>
             </a:stretch>
           </a:blipFill>
         </p:spPr>
-      </p:sp>
-      <p:sp>
-        <p:nvSpPr>
-          <p:cNvPr name="TextBox 5" id="5"/>
-          <p:cNvSpPr txBox="true"/>
+        <p:txBody>
+          <a:bodyPr/>
+          <a:lstStyle/>
+          <a:p>
+            <a:endParaRPr lang="es-CL"/>
+          </a:p>
+        </p:txBody>
+      </p:sp>
+      <p:sp>
+        <p:nvSpPr>
+          <p:cNvPr id="5" name="TextBox 5"/>
+          <p:cNvSpPr txBox="1"/>
           <p:nvPr/>
         </p:nvSpPr>
         <p:spPr>
-          <a:xfrm rot="0">
+          <a:xfrm>
             <a:off x="8584366" y="1190625"/>
             <a:ext cx="8375541" cy="799897"/>
           </a:xfrm>
@@ -3910,7 +3975,7 @@
           </a:prstGeom>
         </p:spPr>
         <p:txBody>
-          <a:bodyPr anchor="t" rtlCol="false" tIns="0" lIns="0" bIns="0" rIns="0">
+          <a:bodyPr lIns="0" tIns="0" rIns="0" bIns="0" rtlCol="0" anchor="t">
             <a:spAutoFit/>
           </a:bodyPr>
           <a:lstStyle/>
@@ -3921,7 +3986,7 @@
               </a:lnSpc>
             </a:pPr>
             <a:r>
-              <a:rPr lang="en-US" b="true" sz="6340">
+              <a:rPr lang="en-US" sz="6340" b="1">
                 <a:solidFill>
                   <a:srgbClr val="000000"/>
                 </a:solidFill>
@@ -3937,12 +4002,12 @@
       </p:sp>
       <p:sp>
         <p:nvSpPr>
-          <p:cNvPr name="TextBox 6" id="6"/>
-          <p:cNvSpPr txBox="true"/>
+          <p:cNvPr id="6" name="TextBox 6"/>
+          <p:cNvSpPr txBox="1"/>
           <p:nvPr/>
         </p:nvSpPr>
         <p:spPr>
-          <a:xfrm rot="0">
+          <a:xfrm>
             <a:off x="8114513" y="2669679"/>
             <a:ext cx="10173487" cy="4188612"/>
           </a:xfrm>
@@ -3951,12 +4016,12 @@
           </a:prstGeom>
         </p:spPr>
         <p:txBody>
-          <a:bodyPr anchor="t" rtlCol="false" tIns="0" lIns="0" bIns="0" rIns="0">
+          <a:bodyPr lIns="0" tIns="0" rIns="0" bIns="0" rtlCol="0" anchor="t">
             <a:spAutoFit/>
           </a:bodyPr>
           <a:lstStyle/>
           <a:p>
-            <a:pPr algn="l" marL="512146" indent="-256073" lvl="1">
+            <a:pPr marL="512146" lvl="1" indent="-256073" algn="l">
               <a:lnSpc>
                 <a:spcPts val="3321"/>
               </a:lnSpc>
@@ -3964,7 +4029,7 @@
               <a:buChar char="•"/>
             </a:pPr>
             <a:r>
-              <a:rPr lang="en-US" b="true" sz="2372">
+              <a:rPr lang="en-US" sz="2372" b="1">
                 <a:solidFill>
                   <a:srgbClr val="000000"/>
                 </a:solidFill>
@@ -3977,7 +4042,7 @@
             </a:r>
           </a:p>
           <a:p>
-            <a:pPr algn="l" marL="512146" indent="-256073" lvl="1">
+            <a:pPr marL="512146" lvl="1" indent="-256073" algn="l">
               <a:lnSpc>
                 <a:spcPts val="3321"/>
               </a:lnSpc>
@@ -3985,7 +4050,7 @@
               <a:buChar char="•"/>
             </a:pPr>
             <a:r>
-              <a:rPr lang="en-US" b="true" sz="2372">
+              <a:rPr lang="en-US" sz="2372" b="1">
                 <a:solidFill>
                   <a:srgbClr val="000000"/>
                 </a:solidFill>
@@ -4010,7 +4075,7 @@
             </a:r>
           </a:p>
           <a:p>
-            <a:pPr algn="l" marL="512146" indent="-256073" lvl="1">
+            <a:pPr marL="512146" lvl="1" indent="-256073" algn="l">
               <a:lnSpc>
                 <a:spcPts val="3321"/>
               </a:lnSpc>
@@ -4018,7 +4083,7 @@
               <a:buChar char="•"/>
             </a:pPr>
             <a:r>
-              <a:rPr lang="en-US" b="true" sz="2372">
+              <a:rPr lang="en-US" sz="2372" b="1">
                 <a:solidFill>
                   <a:srgbClr val="000000"/>
                 </a:solidFill>
@@ -4043,7 +4108,7 @@
             </a:r>
           </a:p>
           <a:p>
-            <a:pPr algn="l" marL="512146" indent="-256073" lvl="1">
+            <a:pPr marL="512146" lvl="1" indent="-256073" algn="l">
               <a:lnSpc>
                 <a:spcPts val="3321"/>
               </a:lnSpc>
@@ -4051,7 +4116,7 @@
               <a:buChar char="•"/>
             </a:pPr>
             <a:r>
-              <a:rPr lang="en-US" b="true" sz="2372">
+              <a:rPr lang="en-US" sz="2372" b="1">
                 <a:solidFill>
                   <a:srgbClr val="000000"/>
                 </a:solidFill>
@@ -4076,7 +4141,7 @@
             </a:r>
           </a:p>
           <a:p>
-            <a:pPr algn="l" marL="512146" indent="-256073" lvl="1">
+            <a:pPr marL="512146" lvl="1" indent="-256073" algn="l">
               <a:lnSpc>
                 <a:spcPts val="3321"/>
               </a:lnSpc>
@@ -4084,7 +4149,7 @@
               <a:buChar char="•"/>
             </a:pPr>
             <a:r>
-              <a:rPr lang="en-US" b="true" sz="2372">
+              <a:rPr lang="en-US" sz="2372" b="1">
                 <a:solidFill>
                   <a:srgbClr val="000000"/>
                 </a:solidFill>
@@ -4109,7 +4174,7 @@
             </a:r>
           </a:p>
           <a:p>
-            <a:pPr algn="l" marL="512146" indent="-256073" lvl="1">
+            <a:pPr marL="512146" lvl="1" indent="-256073" algn="l">
               <a:lnSpc>
                 <a:spcPts val="3321"/>
               </a:lnSpc>
@@ -4117,7 +4182,7 @@
               <a:buChar char="•"/>
             </a:pPr>
             <a:r>
-              <a:rPr lang="en-US" b="true" sz="2372">
+              <a:rPr lang="en-US" sz="2372" b="1">
                 <a:solidFill>
                   <a:srgbClr val="000000"/>
                 </a:solidFill>
@@ -4147,6 +4212,15 @@
                 <a:spcPts val="3321"/>
               </a:lnSpc>
             </a:pPr>
+            <a:endParaRPr lang="en-US" sz="2372">
+              <a:solidFill>
+                <a:srgbClr val="000000"/>
+              </a:solidFill>
+              <a:latin typeface="Montserrat"/>
+              <a:ea typeface="Montserrat"/>
+              <a:cs typeface="Montserrat"/>
+              <a:sym typeface="Montserrat"/>
+            </a:endParaRPr>
           </a:p>
         </p:txBody>
       </p:sp>
@@ -4159,7 +4233,7 @@
 </file>
 
 <file path=ppt/slides/slide4.xml><?xml version="1.0" encoding="utf-8"?>
-<p:sld xmlns:p="http://schemas.openxmlformats.org/presentationml/2006/main" xmlns:a="http://schemas.openxmlformats.org/drawingml/2006/main" xmlns:r="http://schemas.openxmlformats.org/officeDocument/2006/relationships">
+<p:sld xmlns:a="http://schemas.openxmlformats.org/drawingml/2006/main" xmlns:r="http://schemas.openxmlformats.org/officeDocument/2006/relationships" xmlns:p="http://schemas.openxmlformats.org/presentationml/2006/main">
   <p:cSld>
     <p:spTree>
       <p:nvGrpSpPr>
@@ -4177,12 +4251,12 @@
       </p:grpSpPr>
       <p:grpSp>
         <p:nvGrpSpPr>
-          <p:cNvPr name="Group 2" id="2"/>
+          <p:cNvPr id="2" name="Group 2"/>
           <p:cNvGrpSpPr/>
           <p:nvPr/>
         </p:nvGrpSpPr>
         <p:grpSpPr>
-          <a:xfrm rot="0">
+          <a:xfrm>
             <a:off x="0" y="0"/>
             <a:ext cx="2230661" cy="10287000"/>
             <a:chOff x="0" y="0"/>
@@ -4191,12 +4265,12 @@
         </p:grpSpPr>
         <p:sp>
           <p:nvSpPr>
-            <p:cNvPr name="Freeform 3" id="3"/>
+            <p:cNvPr id="3" name="Freeform 3"/>
             <p:cNvSpPr/>
             <p:nvPr/>
           </p:nvSpPr>
           <p:spPr>
-            <a:xfrm flipH="false" flipV="false" rot="0">
+            <a:xfrm>
               <a:off x="0" y="0"/>
               <a:ext cx="415013" cy="1913890"/>
             </a:xfrm>
@@ -4205,9 +4279,9 @@
               <a:gdLst/>
               <a:ahLst/>
               <a:cxnLst/>
-              <a:rect r="r" b="b" t="t" l="l"/>
+              <a:rect l="l" t="t" r="r" b="b"/>
               <a:pathLst>
-                <a:path h="1913890" w="415013">
+                <a:path w="415013" h="1913890">
                   <a:moveTo>
                     <a:pt x="0" y="0"/>
                   </a:moveTo>
@@ -4228,11 +4302,18 @@
               <a:srgbClr val="36528B"/>
             </a:solidFill>
           </p:spPr>
+          <p:txBody>
+            <a:bodyPr/>
+            <a:lstStyle/>
+            <a:p>
+              <a:endParaRPr lang="es-CL"/>
+            </a:p>
+          </p:txBody>
         </p:sp>
       </p:grpSp>
       <p:sp>
         <p:nvSpPr>
-          <p:cNvPr name="AutoShape 4" id="4"/>
+          <p:cNvPr id="4" name="AutoShape 4"/>
           <p:cNvSpPr/>
           <p:nvPr/>
         </p:nvSpPr>
@@ -4244,24 +4325,31 @@
           <a:prstGeom prst="line">
             <a:avLst/>
           </a:prstGeom>
-          <a:ln cap="flat" w="123825">
+          <a:ln w="123825" cap="flat">
             <a:solidFill>
               <a:srgbClr val="36528B"/>
             </a:solidFill>
             <a:prstDash val="solid"/>
-            <a:headEnd type="none" len="sm" w="sm"/>
-            <a:tailEnd type="none" len="sm" w="sm"/>
+            <a:headEnd type="none" w="sm" len="sm"/>
+            <a:tailEnd type="none" w="sm" len="sm"/>
           </a:ln>
         </p:spPr>
+        <p:txBody>
+          <a:bodyPr/>
+          <a:lstStyle/>
+          <a:p>
+            <a:endParaRPr lang="es-CL"/>
+          </a:p>
+        </p:txBody>
       </p:sp>
       <p:grpSp>
         <p:nvGrpSpPr>
-          <p:cNvPr name="Group 5" id="5"/>
+          <p:cNvPr id="5" name="Group 5"/>
           <p:cNvGrpSpPr/>
           <p:nvPr/>
         </p:nvGrpSpPr>
         <p:grpSpPr>
-          <a:xfrm rot="0">
+          <a:xfrm>
             <a:off x="3299734" y="2939817"/>
             <a:ext cx="2203683" cy="2203683"/>
             <a:chOff x="0" y="0"/>
@@ -4270,12 +4358,12 @@
         </p:grpSpPr>
         <p:sp>
           <p:nvSpPr>
-            <p:cNvPr name="Freeform 6" id="6"/>
+            <p:cNvPr id="6" name="Freeform 6"/>
             <p:cNvSpPr/>
             <p:nvPr/>
           </p:nvSpPr>
           <p:spPr>
-            <a:xfrm flipH="false" flipV="false" rot="0">
+            <a:xfrm>
               <a:off x="0" y="0"/>
               <a:ext cx="6350000" cy="6350000"/>
             </a:xfrm>
@@ -4284,9 +4372,9 @@
               <a:gdLst/>
               <a:ahLst/>
               <a:cxnLst/>
-              <a:rect r="r" b="b" t="t" l="l"/>
+              <a:rect l="l" t="t" r="r" b="b"/>
               <a:pathLst>
-                <a:path h="6350000" w="6350000">
+                <a:path w="6350000" h="6350000">
                   <a:moveTo>
                     <a:pt x="3175000" y="0"/>
                   </a:moveTo>
@@ -4318,16 +4406,23 @@
               <a:srgbClr val="7BA64A"/>
             </a:solidFill>
           </p:spPr>
+          <p:txBody>
+            <a:bodyPr/>
+            <a:lstStyle/>
+            <a:p>
+              <a:endParaRPr lang="es-CL"/>
+            </a:p>
+          </p:txBody>
         </p:sp>
       </p:grpSp>
       <p:grpSp>
         <p:nvGrpSpPr>
-          <p:cNvPr name="Group 7" id="7"/>
+          <p:cNvPr id="7" name="Group 7"/>
           <p:cNvGrpSpPr/>
           <p:nvPr/>
         </p:nvGrpSpPr>
         <p:grpSpPr>
-          <a:xfrm rot="0">
+          <a:xfrm>
             <a:off x="6342853" y="2928451"/>
             <a:ext cx="2203683" cy="2203683"/>
             <a:chOff x="0" y="0"/>
@@ -4336,12 +4431,12 @@
         </p:grpSpPr>
         <p:sp>
           <p:nvSpPr>
-            <p:cNvPr name="Freeform 8" id="8"/>
+            <p:cNvPr id="8" name="Freeform 8"/>
             <p:cNvSpPr/>
             <p:nvPr/>
           </p:nvSpPr>
           <p:spPr>
-            <a:xfrm flipH="false" flipV="false" rot="0">
+            <a:xfrm>
               <a:off x="0" y="0"/>
               <a:ext cx="6350000" cy="6350000"/>
             </a:xfrm>
@@ -4350,9 +4445,9 @@
               <a:gdLst/>
               <a:ahLst/>
               <a:cxnLst/>
-              <a:rect r="r" b="b" t="t" l="l"/>
+              <a:rect l="l" t="t" r="r" b="b"/>
               <a:pathLst>
-                <a:path h="6350000" w="6350000">
+                <a:path w="6350000" h="6350000">
                   <a:moveTo>
                     <a:pt x="3175000" y="0"/>
                   </a:moveTo>
@@ -4384,16 +4479,23 @@
               <a:srgbClr val="7BA64A"/>
             </a:solidFill>
           </p:spPr>
+          <p:txBody>
+            <a:bodyPr/>
+            <a:lstStyle/>
+            <a:p>
+              <a:endParaRPr lang="es-CL"/>
+            </a:p>
+          </p:txBody>
         </p:sp>
       </p:grpSp>
       <p:grpSp>
         <p:nvGrpSpPr>
-          <p:cNvPr name="Group 9" id="9"/>
+          <p:cNvPr id="9" name="Group 9"/>
           <p:cNvGrpSpPr/>
           <p:nvPr/>
         </p:nvGrpSpPr>
         <p:grpSpPr>
-          <a:xfrm rot="0">
+          <a:xfrm>
             <a:off x="9385082" y="2928451"/>
             <a:ext cx="2203683" cy="2203683"/>
             <a:chOff x="0" y="0"/>
@@ -4402,12 +4504,12 @@
         </p:grpSpPr>
         <p:sp>
           <p:nvSpPr>
-            <p:cNvPr name="Freeform 10" id="10"/>
+            <p:cNvPr id="10" name="Freeform 10"/>
             <p:cNvSpPr/>
             <p:nvPr/>
           </p:nvSpPr>
           <p:spPr>
-            <a:xfrm flipH="false" flipV="false" rot="0">
+            <a:xfrm>
               <a:off x="0" y="0"/>
               <a:ext cx="6350000" cy="6350000"/>
             </a:xfrm>
@@ -4416,9 +4518,9 @@
               <a:gdLst/>
               <a:ahLst/>
               <a:cxnLst/>
-              <a:rect r="r" b="b" t="t" l="l"/>
+              <a:rect l="l" t="t" r="r" b="b"/>
               <a:pathLst>
-                <a:path h="6350000" w="6350000">
+                <a:path w="6350000" h="6350000">
                   <a:moveTo>
                     <a:pt x="3175000" y="0"/>
                   </a:moveTo>
@@ -4450,16 +4552,23 @@
               <a:srgbClr val="7BA64A"/>
             </a:solidFill>
           </p:spPr>
+          <p:txBody>
+            <a:bodyPr/>
+            <a:lstStyle/>
+            <a:p>
+              <a:endParaRPr lang="es-CL"/>
+            </a:p>
+          </p:txBody>
         </p:sp>
       </p:grpSp>
       <p:grpSp>
         <p:nvGrpSpPr>
-          <p:cNvPr name="Group 11" id="11"/>
+          <p:cNvPr id="11" name="Group 11"/>
           <p:cNvGrpSpPr/>
           <p:nvPr/>
         </p:nvGrpSpPr>
         <p:grpSpPr>
-          <a:xfrm rot="0">
+          <a:xfrm>
             <a:off x="12427310" y="2939817"/>
             <a:ext cx="2203683" cy="2203683"/>
             <a:chOff x="0" y="0"/>
@@ -4468,12 +4577,12 @@
         </p:grpSpPr>
         <p:sp>
           <p:nvSpPr>
-            <p:cNvPr name="Freeform 12" id="12"/>
+            <p:cNvPr id="12" name="Freeform 12"/>
             <p:cNvSpPr/>
             <p:nvPr/>
           </p:nvSpPr>
           <p:spPr>
-            <a:xfrm flipH="false" flipV="false" rot="0">
+            <a:xfrm>
               <a:off x="0" y="0"/>
               <a:ext cx="6350000" cy="6350000"/>
             </a:xfrm>
@@ -4482,9 +4591,9 @@
               <a:gdLst/>
               <a:ahLst/>
               <a:cxnLst/>
-              <a:rect r="r" b="b" t="t" l="l"/>
+              <a:rect l="l" t="t" r="r" b="b"/>
               <a:pathLst>
-                <a:path h="6350000" w="6350000">
+                <a:path w="6350000" h="6350000">
                   <a:moveTo>
                     <a:pt x="3175000" y="0"/>
                   </a:moveTo>
@@ -4516,16 +4625,23 @@
               <a:srgbClr val="7BA64A"/>
             </a:solidFill>
           </p:spPr>
+          <p:txBody>
+            <a:bodyPr/>
+            <a:lstStyle/>
+            <a:p>
+              <a:endParaRPr lang="es-CL"/>
+            </a:p>
+          </p:txBody>
         </p:sp>
       </p:grpSp>
       <p:grpSp>
         <p:nvGrpSpPr>
-          <p:cNvPr name="Group 13" id="13"/>
+          <p:cNvPr id="13" name="Group 13"/>
           <p:cNvGrpSpPr/>
           <p:nvPr/>
         </p:nvGrpSpPr>
         <p:grpSpPr>
-          <a:xfrm rot="0">
+          <a:xfrm>
             <a:off x="15469538" y="2939817"/>
             <a:ext cx="2203683" cy="2203683"/>
             <a:chOff x="0" y="0"/>
@@ -4534,12 +4650,12 @@
         </p:grpSpPr>
         <p:sp>
           <p:nvSpPr>
-            <p:cNvPr name="Freeform 14" id="14"/>
+            <p:cNvPr id="14" name="Freeform 14"/>
             <p:cNvSpPr/>
             <p:nvPr/>
           </p:nvSpPr>
           <p:spPr>
-            <a:xfrm flipH="false" flipV="false" rot="0">
+            <a:xfrm>
               <a:off x="0" y="0"/>
               <a:ext cx="6350000" cy="6350000"/>
             </a:xfrm>
@@ -4548,9 +4664,9 @@
               <a:gdLst/>
               <a:ahLst/>
               <a:cxnLst/>
-              <a:rect r="r" b="b" t="t" l="l"/>
+              <a:rect l="l" t="t" r="r" b="b"/>
               <a:pathLst>
-                <a:path h="6350000" w="6350000">
+                <a:path w="6350000" h="6350000">
                   <a:moveTo>
                     <a:pt x="3175000" y="0"/>
                   </a:moveTo>
@@ -4582,16 +4698,23 @@
               <a:srgbClr val="7BA64A"/>
             </a:solidFill>
           </p:spPr>
+          <p:txBody>
+            <a:bodyPr/>
+            <a:lstStyle/>
+            <a:p>
+              <a:endParaRPr lang="es-CL"/>
+            </a:p>
+          </p:txBody>
         </p:sp>
       </p:grpSp>
       <p:sp>
         <p:nvSpPr>
-          <p:cNvPr name="Freeform 15" id="15"/>
+          <p:cNvPr id="15" name="Freeform 15"/>
           <p:cNvSpPr/>
           <p:nvPr/>
         </p:nvSpPr>
         <p:spPr>
-          <a:xfrm flipH="false" flipV="false" rot="0">
+          <a:xfrm>
             <a:off x="3836117" y="3443290"/>
             <a:ext cx="1130917" cy="1196737"/>
           </a:xfrm>
@@ -4600,9 +4723,9 @@
             <a:gdLst/>
             <a:ahLst/>
             <a:cxnLst/>
-            <a:rect r="r" b="b" t="t" l="l"/>
+            <a:rect l="l" t="t" r="r" b="b"/>
             <a:pathLst>
-              <a:path h="1196737" w="1130917">
+              <a:path w="1130917" h="1196737">
                 <a:moveTo>
                   <a:pt x="0" y="0"/>
                 </a:moveTo>
@@ -4625,19 +4748,26 @@
           <a:blipFill>
             <a:blip r:embed="rId2"/>
             <a:stretch>
-              <a:fillRect l="0" t="0" r="0" b="0"/>
+              <a:fillRect/>
             </a:stretch>
           </a:blipFill>
         </p:spPr>
-      </p:sp>
-      <p:sp>
-        <p:nvSpPr>
-          <p:cNvPr name="Freeform 16" id="16"/>
+        <p:txBody>
+          <a:bodyPr/>
+          <a:lstStyle/>
+          <a:p>
+            <a:endParaRPr lang="es-CL"/>
+          </a:p>
+        </p:txBody>
+      </p:sp>
+      <p:sp>
+        <p:nvSpPr>
+          <p:cNvPr id="16" name="Freeform 16"/>
           <p:cNvSpPr/>
           <p:nvPr/>
         </p:nvSpPr>
         <p:spPr>
-          <a:xfrm flipH="false" flipV="false" rot="0">
+          <a:xfrm>
             <a:off x="6784069" y="3318862"/>
             <a:ext cx="1321253" cy="1441843"/>
           </a:xfrm>
@@ -4646,9 +4776,9 @@
             <a:gdLst/>
             <a:ahLst/>
             <a:cxnLst/>
-            <a:rect r="r" b="b" t="t" l="l"/>
+            <a:rect l="l" t="t" r="r" b="b"/>
             <a:pathLst>
-              <a:path h="1441843" w="1321253">
+              <a:path w="1321253" h="1441843">
                 <a:moveTo>
                   <a:pt x="0" y="0"/>
                 </a:moveTo>
@@ -4671,19 +4801,26 @@
           <a:blipFill>
             <a:blip r:embed="rId3"/>
             <a:stretch>
-              <a:fillRect l="0" t="0" r="0" b="0"/>
+              <a:fillRect/>
             </a:stretch>
           </a:blipFill>
         </p:spPr>
-      </p:sp>
-      <p:sp>
-        <p:nvSpPr>
-          <p:cNvPr name="Freeform 17" id="17"/>
+        <p:txBody>
+          <a:bodyPr/>
+          <a:lstStyle/>
+          <a:p>
+            <a:endParaRPr lang="es-CL"/>
+          </a:p>
+        </p:txBody>
+      </p:sp>
+      <p:sp>
+        <p:nvSpPr>
+          <p:cNvPr id="17" name="Freeform 17"/>
           <p:cNvSpPr/>
           <p:nvPr/>
         </p:nvSpPr>
         <p:spPr>
-          <a:xfrm flipH="false" flipV="false" rot="0">
+          <a:xfrm>
             <a:off x="9634823" y="3223642"/>
             <a:ext cx="1704200" cy="1636032"/>
           </a:xfrm>
@@ -4692,9 +4829,9 @@
             <a:gdLst/>
             <a:ahLst/>
             <a:cxnLst/>
-            <a:rect r="r" b="b" t="t" l="l"/>
+            <a:rect l="l" t="t" r="r" b="b"/>
             <a:pathLst>
-              <a:path h="1636032" w="1704200">
+              <a:path w="1704200" h="1636032">
                 <a:moveTo>
                   <a:pt x="0" y="0"/>
                 </a:moveTo>
@@ -4717,19 +4854,26 @@
           <a:blipFill>
             <a:blip r:embed="rId4"/>
             <a:stretch>
-              <a:fillRect l="0" t="0" r="0" b="0"/>
+              <a:fillRect/>
             </a:stretch>
           </a:blipFill>
         </p:spPr>
-      </p:sp>
-      <p:sp>
-        <p:nvSpPr>
-          <p:cNvPr name="Freeform 18" id="18"/>
+        <p:txBody>
+          <a:bodyPr/>
+          <a:lstStyle/>
+          <a:p>
+            <a:endParaRPr lang="es-CL"/>
+          </a:p>
+        </p:txBody>
+      </p:sp>
+      <p:sp>
+        <p:nvSpPr>
+          <p:cNvPr id="18" name="Freeform 18"/>
           <p:cNvSpPr/>
           <p:nvPr/>
         </p:nvSpPr>
         <p:spPr>
-          <a:xfrm flipH="false" flipV="false" rot="0">
+          <a:xfrm>
             <a:off x="12766289" y="3293432"/>
             <a:ext cx="1525724" cy="1525724"/>
           </a:xfrm>
@@ -4738,9 +4882,9 @@
             <a:gdLst/>
             <a:ahLst/>
             <a:cxnLst/>
-            <a:rect r="r" b="b" t="t" l="l"/>
+            <a:rect l="l" t="t" r="r" b="b"/>
             <a:pathLst>
-              <a:path h="1525724" w="1525724">
+              <a:path w="1525724" h="1525724">
                 <a:moveTo>
                   <a:pt x="0" y="0"/>
                 </a:moveTo>
@@ -4763,19 +4907,26 @@
           <a:blipFill>
             <a:blip r:embed="rId5"/>
             <a:stretch>
-              <a:fillRect l="0" t="0" r="0" b="0"/>
+              <a:fillRect/>
             </a:stretch>
           </a:blipFill>
         </p:spPr>
-      </p:sp>
-      <p:sp>
-        <p:nvSpPr>
-          <p:cNvPr name="Freeform 19" id="19"/>
+        <p:txBody>
+          <a:bodyPr/>
+          <a:lstStyle/>
+          <a:p>
+            <a:endParaRPr lang="es-CL"/>
+          </a:p>
+        </p:txBody>
+      </p:sp>
+      <p:sp>
+        <p:nvSpPr>
+          <p:cNvPr id="19" name="Freeform 19"/>
           <p:cNvSpPr/>
           <p:nvPr/>
         </p:nvSpPr>
         <p:spPr>
-          <a:xfrm flipH="false" flipV="false" rot="0">
+          <a:xfrm>
             <a:off x="15611378" y="3303330"/>
             <a:ext cx="1920003" cy="1476657"/>
           </a:xfrm>
@@ -4784,9 +4935,9 @@
             <a:gdLst/>
             <a:ahLst/>
             <a:cxnLst/>
-            <a:rect r="r" b="b" t="t" l="l"/>
+            <a:rect l="l" t="t" r="r" b="b"/>
             <a:pathLst>
-              <a:path h="1476657" w="1920003">
+              <a:path w="1920003" h="1476657">
                 <a:moveTo>
                   <a:pt x="0" y="0"/>
                 </a:moveTo>
@@ -4809,19 +4960,26 @@
           <a:blipFill>
             <a:blip r:embed="rId6"/>
             <a:stretch>
-              <a:fillRect l="0" t="0" r="0" b="0"/>
+              <a:fillRect/>
             </a:stretch>
           </a:blipFill>
         </p:spPr>
-      </p:sp>
-      <p:sp>
-        <p:nvSpPr>
-          <p:cNvPr name="TextBox 20" id="20"/>
-          <p:cNvSpPr txBox="true"/>
+        <p:txBody>
+          <a:bodyPr/>
+          <a:lstStyle/>
+          <a:p>
+            <a:endParaRPr lang="es-CL"/>
+          </a:p>
+        </p:txBody>
+      </p:sp>
+      <p:sp>
+        <p:nvSpPr>
+          <p:cNvPr id="20" name="TextBox 20"/>
+          <p:cNvSpPr txBox="1"/>
           <p:nvPr/>
         </p:nvSpPr>
         <p:spPr>
-          <a:xfrm rot="0">
+          <a:xfrm>
             <a:off x="3064930" y="565789"/>
             <a:ext cx="14608291" cy="1144898"/>
           </a:xfrm>
@@ -4830,7 +4988,7 @@
           </a:prstGeom>
         </p:spPr>
         <p:txBody>
-          <a:bodyPr anchor="t" rtlCol="false" tIns="0" lIns="0" bIns="0" rIns="0">
+          <a:bodyPr lIns="0" tIns="0" rIns="0" bIns="0" rtlCol="0" anchor="t">
             <a:spAutoFit/>
           </a:bodyPr>
           <a:lstStyle/>
@@ -4841,7 +4999,7 @@
               </a:lnSpc>
             </a:pPr>
             <a:r>
-              <a:rPr lang="en-US" b="true" sz="8999">
+              <a:rPr lang="en-US" sz="8999" b="1">
                 <a:solidFill>
                   <a:srgbClr val="000000"/>
                 </a:solidFill>
@@ -4857,12 +5015,12 @@
       </p:sp>
       <p:sp>
         <p:nvSpPr>
-          <p:cNvPr name="TextBox 21" id="21"/>
-          <p:cNvSpPr txBox="true"/>
+          <p:cNvPr id="21" name="TextBox 21"/>
+          <p:cNvSpPr txBox="1"/>
           <p:nvPr/>
         </p:nvSpPr>
         <p:spPr>
-          <a:xfrm rot="0">
+          <a:xfrm>
             <a:off x="3149997" y="2268683"/>
             <a:ext cx="2503157" cy="438783"/>
           </a:xfrm>
@@ -4871,7 +5029,7 @@
           </a:prstGeom>
         </p:spPr>
         <p:txBody>
-          <a:bodyPr anchor="t" rtlCol="false" tIns="0" lIns="0" bIns="0" rIns="0">
+          <a:bodyPr lIns="0" tIns="0" rIns="0" bIns="0" rtlCol="0" anchor="t">
             <a:spAutoFit/>
           </a:bodyPr>
           <a:lstStyle/>
@@ -4882,7 +5040,7 @@
               </a:lnSpc>
             </a:pPr>
             <a:r>
-              <a:rPr lang="en-US" b="true" sz="2600">
+              <a:rPr lang="en-US" sz="2600" b="1">
                 <a:solidFill>
                   <a:srgbClr val="000000"/>
                 </a:solidFill>
@@ -4898,12 +5056,12 @@
       </p:sp>
       <p:sp>
         <p:nvSpPr>
-          <p:cNvPr name="TextBox 22" id="22"/>
-          <p:cNvSpPr txBox="true"/>
+          <p:cNvPr id="22" name="TextBox 22"/>
+          <p:cNvSpPr txBox="1"/>
           <p:nvPr/>
         </p:nvSpPr>
         <p:spPr>
-          <a:xfrm rot="0">
+          <a:xfrm>
             <a:off x="6193117" y="2268683"/>
             <a:ext cx="2503157" cy="438783"/>
           </a:xfrm>
@@ -4912,7 +5070,7 @@
           </a:prstGeom>
         </p:spPr>
         <p:txBody>
-          <a:bodyPr anchor="t" rtlCol="false" tIns="0" lIns="0" bIns="0" rIns="0">
+          <a:bodyPr lIns="0" tIns="0" rIns="0" bIns="0" rtlCol="0" anchor="t">
             <a:spAutoFit/>
           </a:bodyPr>
           <a:lstStyle/>
@@ -4923,7 +5081,7 @@
               </a:lnSpc>
             </a:pPr>
             <a:r>
-              <a:rPr lang="en-US" b="true" sz="2600">
+              <a:rPr lang="en-US" sz="2600" b="1">
                 <a:solidFill>
                   <a:srgbClr val="000000"/>
                 </a:solidFill>
@@ -4939,12 +5097,12 @@
       </p:sp>
       <p:sp>
         <p:nvSpPr>
-          <p:cNvPr name="TextBox 23" id="23"/>
-          <p:cNvSpPr txBox="true"/>
+          <p:cNvPr id="23" name="TextBox 23"/>
+          <p:cNvSpPr txBox="1"/>
           <p:nvPr/>
         </p:nvSpPr>
         <p:spPr>
-          <a:xfrm rot="0">
+          <a:xfrm>
             <a:off x="9239199" y="2268683"/>
             <a:ext cx="2503157" cy="438783"/>
           </a:xfrm>
@@ -4953,7 +5111,7 @@
           </a:prstGeom>
         </p:spPr>
         <p:txBody>
-          <a:bodyPr anchor="t" rtlCol="false" tIns="0" lIns="0" bIns="0" rIns="0">
+          <a:bodyPr lIns="0" tIns="0" rIns="0" bIns="0" rtlCol="0" anchor="t">
             <a:spAutoFit/>
           </a:bodyPr>
           <a:lstStyle/>
@@ -4964,7 +5122,7 @@
               </a:lnSpc>
             </a:pPr>
             <a:r>
-              <a:rPr lang="en-US" b="true" sz="2600">
+              <a:rPr lang="en-US" sz="2600" b="1">
                 <a:solidFill>
                   <a:srgbClr val="000000"/>
                 </a:solidFill>
@@ -4980,12 +5138,12 @@
       </p:sp>
       <p:sp>
         <p:nvSpPr>
-          <p:cNvPr name="TextBox 24" id="24"/>
-          <p:cNvSpPr txBox="true"/>
+          <p:cNvPr id="24" name="TextBox 24"/>
+          <p:cNvSpPr txBox="1"/>
           <p:nvPr/>
         </p:nvSpPr>
         <p:spPr>
-          <a:xfrm rot="0">
+          <a:xfrm>
             <a:off x="12285280" y="1844504"/>
             <a:ext cx="2503157" cy="895983"/>
           </a:xfrm>
@@ -4994,7 +5152,7 @@
           </a:prstGeom>
         </p:spPr>
         <p:txBody>
-          <a:bodyPr anchor="t" rtlCol="false" tIns="0" lIns="0" bIns="0" rIns="0">
+          <a:bodyPr lIns="0" tIns="0" rIns="0" bIns="0" rtlCol="0" anchor="t">
             <a:spAutoFit/>
           </a:bodyPr>
           <a:lstStyle/>
@@ -5005,7 +5163,7 @@
               </a:lnSpc>
             </a:pPr>
             <a:r>
-              <a:rPr lang="en-US" b="true" sz="2600">
+              <a:rPr lang="en-US" sz="2600" b="1">
                 <a:solidFill>
                   <a:srgbClr val="000000"/>
                 </a:solidFill>
@@ -5021,12 +5179,12 @@
       </p:sp>
       <p:sp>
         <p:nvSpPr>
-          <p:cNvPr name="TextBox 25" id="25"/>
-          <p:cNvSpPr txBox="true"/>
+          <p:cNvPr id="25" name="TextBox 25"/>
+          <p:cNvSpPr txBox="1"/>
           <p:nvPr/>
         </p:nvSpPr>
         <p:spPr>
-          <a:xfrm rot="0">
+          <a:xfrm>
             <a:off x="3299734" y="5322635"/>
             <a:ext cx="2503157" cy="2347593"/>
           </a:xfrm>
@@ -5035,12 +5193,12 @@
           </a:prstGeom>
         </p:spPr>
         <p:txBody>
-          <a:bodyPr anchor="t" rtlCol="false" tIns="0" lIns="0" bIns="0" rIns="0">
+          <a:bodyPr lIns="0" tIns="0" rIns="0" bIns="0" rtlCol="0" anchor="t">
             <a:spAutoFit/>
           </a:bodyPr>
           <a:lstStyle/>
           <a:p>
-            <a:pPr algn="l" marL="367048" indent="-183524" lvl="1">
+            <a:pPr marL="367048" lvl="1" indent="-183524" algn="l">
               <a:lnSpc>
                 <a:spcPts val="2380"/>
               </a:lnSpc>
@@ -5048,7 +5206,7 @@
               <a:buChar char="•"/>
             </a:pPr>
             <a:r>
-              <a:rPr lang="en-US" b="true" sz="1700">
+              <a:rPr lang="en-US" sz="1700" b="1">
                 <a:solidFill>
                   <a:srgbClr val="000000"/>
                 </a:solidFill>
@@ -5061,7 +5219,7 @@
             </a:r>
           </a:p>
           <a:p>
-            <a:pPr algn="l" marL="367048" indent="-183524" lvl="1">
+            <a:pPr marL="367048" lvl="1" indent="-183524" algn="l">
               <a:lnSpc>
                 <a:spcPts val="2380"/>
               </a:lnSpc>
@@ -5069,7 +5227,7 @@
               <a:buChar char="•"/>
             </a:pPr>
             <a:r>
-              <a:rPr lang="en-US" b="true" sz="1700">
+              <a:rPr lang="en-US" sz="1700" b="1">
                 <a:solidFill>
                   <a:srgbClr val="000000"/>
                 </a:solidFill>
@@ -5082,7 +5240,7 @@
             </a:r>
           </a:p>
           <a:p>
-            <a:pPr algn="l" marL="367048" indent="-183524" lvl="1">
+            <a:pPr marL="367048" lvl="1" indent="-183524" algn="l">
               <a:lnSpc>
                 <a:spcPts val="2380"/>
               </a:lnSpc>
@@ -5090,7 +5248,7 @@
               <a:buChar char="•"/>
             </a:pPr>
             <a:r>
-              <a:rPr lang="en-US" b="true" sz="1700">
+              <a:rPr lang="en-US" sz="1700" b="1">
                 <a:solidFill>
                   <a:srgbClr val="000000"/>
                 </a:solidFill>
@@ -5108,6 +5266,15 @@
                 <a:spcPts val="2380"/>
               </a:lnSpc>
             </a:pPr>
+            <a:endParaRPr lang="en-US" sz="1700" b="1">
+              <a:solidFill>
+                <a:srgbClr val="000000"/>
+              </a:solidFill>
+              <a:latin typeface="Montserrat Bold"/>
+              <a:ea typeface="Montserrat Bold"/>
+              <a:cs typeface="Montserrat Bold"/>
+              <a:sym typeface="Montserrat Bold"/>
+            </a:endParaRPr>
           </a:p>
           <a:p>
             <a:pPr algn="l">
@@ -5115,6 +5282,15 @@
                 <a:spcPts val="2380"/>
               </a:lnSpc>
             </a:pPr>
+            <a:endParaRPr lang="en-US" sz="1700" b="1">
+              <a:solidFill>
+                <a:srgbClr val="000000"/>
+              </a:solidFill>
+              <a:latin typeface="Montserrat Bold"/>
+              <a:ea typeface="Montserrat Bold"/>
+              <a:cs typeface="Montserrat Bold"/>
+              <a:sym typeface="Montserrat Bold"/>
+            </a:endParaRPr>
           </a:p>
           <a:p>
             <a:pPr algn="l">
@@ -5122,6 +5298,15 @@
                 <a:spcPts val="2380"/>
               </a:lnSpc>
             </a:pPr>
+            <a:endParaRPr lang="en-US" sz="1700" b="1">
+              <a:solidFill>
+                <a:srgbClr val="000000"/>
+              </a:solidFill>
+              <a:latin typeface="Montserrat Bold"/>
+              <a:ea typeface="Montserrat Bold"/>
+              <a:cs typeface="Montserrat Bold"/>
+              <a:sym typeface="Montserrat Bold"/>
+            </a:endParaRPr>
           </a:p>
           <a:p>
             <a:pPr algn="l">
@@ -5129,6 +5314,15 @@
                 <a:spcPts val="2380"/>
               </a:lnSpc>
             </a:pPr>
+            <a:endParaRPr lang="en-US" sz="1700" b="1">
+              <a:solidFill>
+                <a:srgbClr val="000000"/>
+              </a:solidFill>
+              <a:latin typeface="Montserrat Bold"/>
+              <a:ea typeface="Montserrat Bold"/>
+              <a:cs typeface="Montserrat Bold"/>
+              <a:sym typeface="Montserrat Bold"/>
+            </a:endParaRPr>
           </a:p>
           <a:p>
             <a:pPr algn="l">
@@ -5136,17 +5330,26 @@
                 <a:spcPts val="2380"/>
               </a:lnSpc>
             </a:pPr>
-          </a:p>
-        </p:txBody>
-      </p:sp>
-      <p:sp>
-        <p:nvSpPr>
-          <p:cNvPr name="TextBox 26" id="26"/>
-          <p:cNvSpPr txBox="true"/>
+            <a:endParaRPr lang="en-US" sz="1700" b="1">
+              <a:solidFill>
+                <a:srgbClr val="000000"/>
+              </a:solidFill>
+              <a:latin typeface="Montserrat Bold"/>
+              <a:ea typeface="Montserrat Bold"/>
+              <a:cs typeface="Montserrat Bold"/>
+              <a:sym typeface="Montserrat Bold"/>
+            </a:endParaRPr>
+          </a:p>
+        </p:txBody>
+      </p:sp>
+      <p:sp>
+        <p:nvSpPr>
+          <p:cNvPr id="26" name="TextBox 26"/>
+          <p:cNvSpPr txBox="1"/>
           <p:nvPr/>
         </p:nvSpPr>
         <p:spPr>
-          <a:xfrm rot="0">
+          <a:xfrm>
             <a:off x="6486614" y="5313110"/>
             <a:ext cx="2113942" cy="1747172"/>
           </a:xfrm>
@@ -5155,12 +5358,12 @@
           </a:prstGeom>
         </p:spPr>
         <p:txBody>
-          <a:bodyPr anchor="t" rtlCol="false" tIns="0" lIns="0" bIns="0" rIns="0">
+          <a:bodyPr lIns="0" tIns="0" rIns="0" bIns="0" rtlCol="0" anchor="t">
             <a:spAutoFit/>
           </a:bodyPr>
           <a:lstStyle/>
           <a:p>
-            <a:pPr algn="l" marL="309976" indent="-154988" lvl="1">
+            <a:pPr marL="309976" lvl="1" indent="-154988" algn="l">
               <a:lnSpc>
                 <a:spcPts val="2010"/>
               </a:lnSpc>
@@ -5168,7 +5371,7 @@
               <a:buChar char="•"/>
             </a:pPr>
             <a:r>
-              <a:rPr lang="en-US" b="true" sz="1435">
+              <a:rPr lang="en-US" sz="1435" b="1">
                 <a:solidFill>
                   <a:srgbClr val="000000"/>
                 </a:solidFill>
@@ -5181,7 +5384,7 @@
             </a:r>
           </a:p>
           <a:p>
-            <a:pPr algn="l" marL="309976" indent="-154988" lvl="1">
+            <a:pPr marL="309976" lvl="1" indent="-154988" algn="l">
               <a:lnSpc>
                 <a:spcPts val="2010"/>
               </a:lnSpc>
@@ -5189,7 +5392,7 @@
               <a:buChar char="•"/>
             </a:pPr>
             <a:r>
-              <a:rPr lang="en-US" b="true" sz="1435">
+              <a:rPr lang="en-US" sz="1435" b="1">
                 <a:solidFill>
                   <a:srgbClr val="000000"/>
                 </a:solidFill>
@@ -5207,6 +5410,15 @@
                 <a:spcPts val="2010"/>
               </a:lnSpc>
             </a:pPr>
+            <a:endParaRPr lang="en-US" sz="1435" b="1">
+              <a:solidFill>
+                <a:srgbClr val="000000"/>
+              </a:solidFill>
+              <a:latin typeface="Montserrat Bold"/>
+              <a:ea typeface="Montserrat Bold"/>
+              <a:cs typeface="Montserrat Bold"/>
+              <a:sym typeface="Montserrat Bold"/>
+            </a:endParaRPr>
           </a:p>
           <a:p>
             <a:pPr algn="l">
@@ -5214,6 +5426,15 @@
                 <a:spcPts val="2010"/>
               </a:lnSpc>
             </a:pPr>
+            <a:endParaRPr lang="en-US" sz="1435" b="1">
+              <a:solidFill>
+                <a:srgbClr val="000000"/>
+              </a:solidFill>
+              <a:latin typeface="Montserrat Bold"/>
+              <a:ea typeface="Montserrat Bold"/>
+              <a:cs typeface="Montserrat Bold"/>
+              <a:sym typeface="Montserrat Bold"/>
+            </a:endParaRPr>
           </a:p>
           <a:p>
             <a:pPr algn="l">
@@ -5221,6 +5442,15 @@
                 <a:spcPts val="2010"/>
               </a:lnSpc>
             </a:pPr>
+            <a:endParaRPr lang="en-US" sz="1435" b="1">
+              <a:solidFill>
+                <a:srgbClr val="000000"/>
+              </a:solidFill>
+              <a:latin typeface="Montserrat Bold"/>
+              <a:ea typeface="Montserrat Bold"/>
+              <a:cs typeface="Montserrat Bold"/>
+              <a:sym typeface="Montserrat Bold"/>
+            </a:endParaRPr>
           </a:p>
           <a:p>
             <a:pPr algn="l">
@@ -5228,17 +5458,26 @@
                 <a:spcPts val="2010"/>
               </a:lnSpc>
             </a:pPr>
-          </a:p>
-        </p:txBody>
-      </p:sp>
-      <p:sp>
-        <p:nvSpPr>
-          <p:cNvPr name="TextBox 27" id="27"/>
-          <p:cNvSpPr txBox="true"/>
+            <a:endParaRPr lang="en-US" sz="1435" b="1">
+              <a:solidFill>
+                <a:srgbClr val="000000"/>
+              </a:solidFill>
+              <a:latin typeface="Montserrat Bold"/>
+              <a:ea typeface="Montserrat Bold"/>
+              <a:cs typeface="Montserrat Bold"/>
+              <a:sym typeface="Montserrat Bold"/>
+            </a:endParaRPr>
+          </a:p>
+        </p:txBody>
+      </p:sp>
+      <p:sp>
+        <p:nvSpPr>
+          <p:cNvPr id="27" name="TextBox 27"/>
+          <p:cNvSpPr txBox="1"/>
           <p:nvPr/>
         </p:nvSpPr>
         <p:spPr>
-          <a:xfrm rot="0">
+          <a:xfrm>
             <a:off x="9255581" y="5322635"/>
             <a:ext cx="2503157" cy="1757043"/>
           </a:xfrm>
@@ -5247,12 +5486,12 @@
           </a:prstGeom>
         </p:spPr>
         <p:txBody>
-          <a:bodyPr anchor="t" rtlCol="false" tIns="0" lIns="0" bIns="0" rIns="0">
+          <a:bodyPr lIns="0" tIns="0" rIns="0" bIns="0" rtlCol="0" anchor="t">
             <a:spAutoFit/>
           </a:bodyPr>
           <a:lstStyle/>
           <a:p>
-            <a:pPr algn="l" marL="367048" indent="-183524" lvl="1">
+            <a:pPr marL="367048" lvl="1" indent="-183524" algn="l">
               <a:lnSpc>
                 <a:spcPts val="2380"/>
               </a:lnSpc>
@@ -5260,7 +5499,7 @@
               <a:buChar char="•"/>
             </a:pPr>
             <a:r>
-              <a:rPr lang="en-US" b="true" sz="1700">
+              <a:rPr lang="en-US" sz="1700" b="1">
                 <a:solidFill>
                   <a:srgbClr val="000000"/>
                 </a:solidFill>
@@ -5273,7 +5512,7 @@
             </a:r>
           </a:p>
           <a:p>
-            <a:pPr algn="l" marL="367048" indent="-183524" lvl="1">
+            <a:pPr marL="367048" lvl="1" indent="-183524" algn="l">
               <a:lnSpc>
                 <a:spcPts val="2380"/>
               </a:lnSpc>
@@ -5281,7 +5520,7 @@
               <a:buChar char="•"/>
             </a:pPr>
             <a:r>
-              <a:rPr lang="en-US" b="true" sz="1700">
+              <a:rPr lang="en-US" sz="1700" b="1">
                 <a:solidFill>
                   <a:srgbClr val="000000"/>
                 </a:solidFill>
@@ -5299,6 +5538,15 @@
                 <a:spcPts val="2380"/>
               </a:lnSpc>
             </a:pPr>
+            <a:endParaRPr lang="en-US" sz="1700" b="1">
+              <a:solidFill>
+                <a:srgbClr val="000000"/>
+              </a:solidFill>
+              <a:latin typeface="Montserrat Bold"/>
+              <a:ea typeface="Montserrat Bold"/>
+              <a:cs typeface="Montserrat Bold"/>
+              <a:sym typeface="Montserrat Bold"/>
+            </a:endParaRPr>
           </a:p>
           <a:p>
             <a:pPr algn="l">
@@ -5306,6 +5554,15 @@
                 <a:spcPts val="2380"/>
               </a:lnSpc>
             </a:pPr>
+            <a:endParaRPr lang="en-US" sz="1700" b="1">
+              <a:solidFill>
+                <a:srgbClr val="000000"/>
+              </a:solidFill>
+              <a:latin typeface="Montserrat Bold"/>
+              <a:ea typeface="Montserrat Bold"/>
+              <a:cs typeface="Montserrat Bold"/>
+              <a:sym typeface="Montserrat Bold"/>
+            </a:endParaRPr>
           </a:p>
           <a:p>
             <a:pPr algn="l">
@@ -5313,6 +5570,15 @@
                 <a:spcPts val="2380"/>
               </a:lnSpc>
             </a:pPr>
+            <a:endParaRPr lang="en-US" sz="1700" b="1">
+              <a:solidFill>
+                <a:srgbClr val="000000"/>
+              </a:solidFill>
+              <a:latin typeface="Montserrat Bold"/>
+              <a:ea typeface="Montserrat Bold"/>
+              <a:cs typeface="Montserrat Bold"/>
+              <a:sym typeface="Montserrat Bold"/>
+            </a:endParaRPr>
           </a:p>
           <a:p>
             <a:pPr algn="l">
@@ -5320,17 +5586,26 @@
                 <a:spcPts val="2380"/>
               </a:lnSpc>
             </a:pPr>
-          </a:p>
-        </p:txBody>
-      </p:sp>
-      <p:sp>
-        <p:nvSpPr>
-          <p:cNvPr name="TextBox 28" id="28"/>
-          <p:cNvSpPr txBox="true"/>
+            <a:endParaRPr lang="en-US" sz="1700" b="1">
+              <a:solidFill>
+                <a:srgbClr val="000000"/>
+              </a:solidFill>
+              <a:latin typeface="Montserrat Bold"/>
+              <a:ea typeface="Montserrat Bold"/>
+              <a:cs typeface="Montserrat Bold"/>
+              <a:sym typeface="Montserrat Bold"/>
+            </a:endParaRPr>
+          </a:p>
+        </p:txBody>
+      </p:sp>
+      <p:sp>
+        <p:nvSpPr>
+          <p:cNvPr id="28" name="TextBox 28"/>
+          <p:cNvSpPr txBox="1"/>
           <p:nvPr/>
         </p:nvSpPr>
         <p:spPr>
-          <a:xfrm rot="0">
+          <a:xfrm>
             <a:off x="12339763" y="5343525"/>
             <a:ext cx="2503157" cy="871218"/>
           </a:xfrm>
@@ -5339,12 +5614,12 @@
           </a:prstGeom>
         </p:spPr>
         <p:txBody>
-          <a:bodyPr anchor="t" rtlCol="false" tIns="0" lIns="0" bIns="0" rIns="0">
+          <a:bodyPr lIns="0" tIns="0" rIns="0" bIns="0" rtlCol="0" anchor="t">
             <a:spAutoFit/>
           </a:bodyPr>
           <a:lstStyle/>
           <a:p>
-            <a:pPr algn="l" marL="367048" indent="-183524" lvl="1">
+            <a:pPr marL="367048" lvl="1" indent="-183524" algn="l">
               <a:lnSpc>
                 <a:spcPts val="2380"/>
               </a:lnSpc>
@@ -5352,7 +5627,7 @@
               <a:buChar char="•"/>
             </a:pPr>
             <a:r>
-              <a:rPr lang="en-US" b="true" sz="1700">
+              <a:rPr lang="en-US" sz="1700" b="1">
                 <a:solidFill>
                   <a:srgbClr val="000000"/>
                 </a:solidFill>
@@ -5370,6 +5645,15 @@
                 <a:spcPts val="2380"/>
               </a:lnSpc>
             </a:pPr>
+            <a:endParaRPr lang="en-US" sz="1700" b="1">
+              <a:solidFill>
+                <a:srgbClr val="000000"/>
+              </a:solidFill>
+              <a:latin typeface="Montserrat Bold"/>
+              <a:ea typeface="Montserrat Bold"/>
+              <a:cs typeface="Montserrat Bold"/>
+              <a:sym typeface="Montserrat Bold"/>
+            </a:endParaRPr>
           </a:p>
           <a:p>
             <a:pPr algn="l">
@@ -5377,17 +5661,26 @@
                 <a:spcPts val="2380"/>
               </a:lnSpc>
             </a:pPr>
-          </a:p>
-        </p:txBody>
-      </p:sp>
-      <p:sp>
-        <p:nvSpPr>
-          <p:cNvPr name="TextBox 29" id="29"/>
-          <p:cNvSpPr txBox="true"/>
+            <a:endParaRPr lang="en-US" sz="1700" b="1">
+              <a:solidFill>
+                <a:srgbClr val="000000"/>
+              </a:solidFill>
+              <a:latin typeface="Montserrat Bold"/>
+              <a:ea typeface="Montserrat Bold"/>
+              <a:cs typeface="Montserrat Bold"/>
+              <a:sym typeface="Montserrat Bold"/>
+            </a:endParaRPr>
+          </a:p>
+        </p:txBody>
+      </p:sp>
+      <p:sp>
+        <p:nvSpPr>
+          <p:cNvPr id="29" name="TextBox 29"/>
+          <p:cNvSpPr txBox="1"/>
           <p:nvPr/>
         </p:nvSpPr>
         <p:spPr>
-          <a:xfrm rot="0">
+          <a:xfrm>
             <a:off x="15319801" y="5322635"/>
             <a:ext cx="2503157" cy="280668"/>
           </a:xfrm>
@@ -5396,12 +5689,12 @@
           </a:prstGeom>
         </p:spPr>
         <p:txBody>
-          <a:bodyPr anchor="t" rtlCol="false" tIns="0" lIns="0" bIns="0" rIns="0">
+          <a:bodyPr lIns="0" tIns="0" rIns="0" bIns="0" rtlCol="0" anchor="t">
             <a:spAutoFit/>
           </a:bodyPr>
           <a:lstStyle/>
           <a:p>
-            <a:pPr algn="l" marL="367048" indent="-183524" lvl="1">
+            <a:pPr marL="367048" lvl="1" indent="-183524" algn="l">
               <a:lnSpc>
                 <a:spcPts val="2380"/>
               </a:lnSpc>
@@ -5409,7 +5702,7 @@
               <a:buChar char="•"/>
             </a:pPr>
             <a:r>
-              <a:rPr lang="en-US" b="true" sz="1700">
+              <a:rPr lang="en-US" sz="1700" b="1">
                 <a:solidFill>
                   <a:srgbClr val="000000"/>
                 </a:solidFill>
@@ -5425,12 +5718,12 @@
       </p:sp>
       <p:sp>
         <p:nvSpPr>
-          <p:cNvPr name="TextBox 30" id="30"/>
-          <p:cNvSpPr txBox="true"/>
+          <p:cNvPr id="30" name="TextBox 30"/>
+          <p:cNvSpPr txBox="1"/>
           <p:nvPr/>
         </p:nvSpPr>
         <p:spPr>
-          <a:xfrm rot="0">
+          <a:xfrm>
             <a:off x="14756143" y="2268683"/>
             <a:ext cx="3577687" cy="438783"/>
           </a:xfrm>
@@ -5439,7 +5732,7 @@
           </a:prstGeom>
         </p:spPr>
         <p:txBody>
-          <a:bodyPr anchor="t" rtlCol="false" tIns="0" lIns="0" bIns="0" rIns="0">
+          <a:bodyPr lIns="0" tIns="0" rIns="0" bIns="0" rtlCol="0" anchor="t">
             <a:spAutoFit/>
           </a:bodyPr>
           <a:lstStyle/>
@@ -5450,7 +5743,7 @@
               </a:lnSpc>
             </a:pPr>
             <a:r>
-              <a:rPr lang="en-US" b="true" sz="2600">
+              <a:rPr lang="en-US" sz="2600" b="1">
                 <a:solidFill>
                   <a:srgbClr val="000000"/>
                 </a:solidFill>
@@ -5466,12 +5759,12 @@
       </p:sp>
       <p:sp>
         <p:nvSpPr>
-          <p:cNvPr name="Freeform 31" id="31"/>
+          <p:cNvPr id="31" name="Freeform 31"/>
           <p:cNvSpPr/>
           <p:nvPr/>
         </p:nvSpPr>
         <p:spPr>
-          <a:xfrm flipH="false" flipV="false" rot="0">
+          <a:xfrm>
             <a:off x="4957371" y="7771268"/>
             <a:ext cx="11059105" cy="1769457"/>
           </a:xfrm>
@@ -5480,9 +5773,9 @@
             <a:gdLst/>
             <a:ahLst/>
             <a:cxnLst/>
-            <a:rect r="r" b="b" t="t" l="l"/>
+            <a:rect l="l" t="t" r="r" b="b"/>
             <a:pathLst>
-              <a:path h="1769457" w="11059105">
+              <a:path w="11059105" h="1769457">
                 <a:moveTo>
                   <a:pt x="0" y="0"/>
                 </a:moveTo>
@@ -5505,19 +5798,26 @@
           <a:blipFill>
             <a:blip r:embed="rId7"/>
             <a:stretch>
-              <a:fillRect l="0" t="0" r="0" b="0"/>
+              <a:fillRect/>
             </a:stretch>
           </a:blipFill>
         </p:spPr>
-      </p:sp>
-      <p:sp>
-        <p:nvSpPr>
-          <p:cNvPr name="Freeform 32" id="32"/>
+        <p:txBody>
+          <a:bodyPr/>
+          <a:lstStyle/>
+          <a:p>
+            <a:endParaRPr lang="es-CL"/>
+          </a:p>
+        </p:txBody>
+      </p:sp>
+      <p:sp>
+        <p:nvSpPr>
+          <p:cNvPr id="32" name="Freeform 32"/>
           <p:cNvSpPr/>
           <p:nvPr/>
         </p:nvSpPr>
         <p:spPr>
-          <a:xfrm flipH="false" flipV="false" rot="0">
+          <a:xfrm>
             <a:off x="5558167" y="6763442"/>
             <a:ext cx="826583" cy="835188"/>
           </a:xfrm>
@@ -5526,9 +5826,9 @@
             <a:gdLst/>
             <a:ahLst/>
             <a:cxnLst/>
-            <a:rect r="r" b="b" t="t" l="l"/>
+            <a:rect l="l" t="t" r="r" b="b"/>
             <a:pathLst>
-              <a:path h="835188" w="826583">
+              <a:path w="826583" h="835188">
                 <a:moveTo>
                   <a:pt x="0" y="0"/>
                 </a:moveTo>
@@ -5551,19 +5851,26 @@
           <a:blipFill>
             <a:blip r:embed="rId8"/>
             <a:stretch>
-              <a:fillRect l="0" t="-2411" r="0" b="-1667"/>
+              <a:fillRect t="-2411" b="-1667"/>
             </a:stretch>
           </a:blipFill>
         </p:spPr>
-      </p:sp>
-      <p:sp>
-        <p:nvSpPr>
-          <p:cNvPr name="Freeform 33" id="33"/>
+        <p:txBody>
+          <a:bodyPr/>
+          <a:lstStyle/>
+          <a:p>
+            <a:endParaRPr lang="es-CL"/>
+          </a:p>
+        </p:txBody>
+      </p:sp>
+      <p:sp>
+        <p:nvSpPr>
+          <p:cNvPr id="33" name="Freeform 33"/>
           <p:cNvSpPr/>
           <p:nvPr/>
         </p:nvSpPr>
         <p:spPr>
-          <a:xfrm flipH="false" flipV="false" rot="0">
+          <a:xfrm>
             <a:off x="7730084" y="6700518"/>
             <a:ext cx="1012346" cy="1070750"/>
           </a:xfrm>
@@ -5572,9 +5879,9 @@
             <a:gdLst/>
             <a:ahLst/>
             <a:cxnLst/>
-            <a:rect r="r" b="b" t="t" l="l"/>
+            <a:rect l="l" t="t" r="r" b="b"/>
             <a:pathLst>
-              <a:path h="1070750" w="1012346">
+              <a:path w="1012346" h="1070750">
                 <a:moveTo>
                   <a:pt x="0" y="0"/>
                 </a:moveTo>
@@ -5597,19 +5904,26 @@
           <a:blipFill>
             <a:blip r:embed="rId9"/>
             <a:stretch>
-              <a:fillRect l="0" t="0" r="0" b="0"/>
+              <a:fillRect/>
             </a:stretch>
           </a:blipFill>
         </p:spPr>
-      </p:sp>
-      <p:sp>
-        <p:nvSpPr>
-          <p:cNvPr name="Freeform 34" id="34"/>
+        <p:txBody>
+          <a:bodyPr/>
+          <a:lstStyle/>
+          <a:p>
+            <a:endParaRPr lang="es-CL"/>
+          </a:p>
+        </p:txBody>
+      </p:sp>
+      <p:sp>
+        <p:nvSpPr>
+          <p:cNvPr id="34" name="Freeform 34"/>
           <p:cNvSpPr/>
           <p:nvPr/>
         </p:nvSpPr>
         <p:spPr>
-          <a:xfrm flipH="false" flipV="false" rot="0">
+          <a:xfrm>
             <a:off x="10565759" y="6873156"/>
             <a:ext cx="575104" cy="725475"/>
           </a:xfrm>
@@ -5618,9 +5932,9 @@
             <a:gdLst/>
             <a:ahLst/>
             <a:cxnLst/>
-            <a:rect r="r" b="b" t="t" l="l"/>
+            <a:rect l="l" t="t" r="r" b="b"/>
             <a:pathLst>
-              <a:path h="725475" w="575104">
+              <a:path w="575104" h="725475">
                 <a:moveTo>
                   <a:pt x="0" y="0"/>
                 </a:moveTo>
@@ -5643,19 +5957,26 @@
           <a:blipFill>
             <a:blip r:embed="rId10"/>
             <a:stretch>
-              <a:fillRect l="0" t="0" r="0" b="0"/>
+              <a:fillRect/>
             </a:stretch>
           </a:blipFill>
         </p:spPr>
-      </p:sp>
-      <p:sp>
-        <p:nvSpPr>
-          <p:cNvPr name="Freeform 35" id="35"/>
+        <p:txBody>
+          <a:bodyPr/>
+          <a:lstStyle/>
+          <a:p>
+            <a:endParaRPr lang="es-CL"/>
+          </a:p>
+        </p:txBody>
+      </p:sp>
+      <p:sp>
+        <p:nvSpPr>
+          <p:cNvPr id="35" name="Freeform 35"/>
           <p:cNvSpPr/>
           <p:nvPr/>
         </p:nvSpPr>
         <p:spPr>
-          <a:xfrm flipH="false" flipV="false" rot="0">
+          <a:xfrm>
             <a:off x="12098062" y="6748783"/>
             <a:ext cx="923482" cy="923482"/>
           </a:xfrm>
@@ -5664,9 +5985,9 @@
             <a:gdLst/>
             <a:ahLst/>
             <a:cxnLst/>
-            <a:rect r="r" b="b" t="t" l="l"/>
+            <a:rect l="l" t="t" r="r" b="b"/>
             <a:pathLst>
-              <a:path h="923482" w="923482">
+              <a:path w="923482" h="923482">
                 <a:moveTo>
                   <a:pt x="0" y="0"/>
                 </a:moveTo>
@@ -5689,19 +6010,26 @@
           <a:blipFill>
             <a:blip r:embed="rId11"/>
             <a:stretch>
-              <a:fillRect l="0" t="0" r="0" b="0"/>
+              <a:fillRect/>
             </a:stretch>
           </a:blipFill>
         </p:spPr>
-      </p:sp>
-      <p:sp>
-        <p:nvSpPr>
-          <p:cNvPr name="Freeform 36" id="36"/>
+        <p:txBody>
+          <a:bodyPr/>
+          <a:lstStyle/>
+          <a:p>
+            <a:endParaRPr lang="es-CL"/>
+          </a:p>
+        </p:txBody>
+      </p:sp>
+      <p:sp>
+        <p:nvSpPr>
+          <p:cNvPr id="36" name="Freeform 36"/>
           <p:cNvSpPr/>
           <p:nvPr/>
         </p:nvSpPr>
         <p:spPr>
-          <a:xfrm flipH="false" flipV="false" rot="0">
+          <a:xfrm>
             <a:off x="12729166" y="7007424"/>
             <a:ext cx="584757" cy="591207"/>
           </a:xfrm>
@@ -5710,9 +6038,9 @@
             <a:gdLst/>
             <a:ahLst/>
             <a:cxnLst/>
-            <a:rect r="r" b="b" t="t" l="l"/>
+            <a:rect l="l" t="t" r="r" b="b"/>
             <a:pathLst>
-              <a:path h="591207" w="584757">
+              <a:path w="584757" h="591207">
                 <a:moveTo>
                   <a:pt x="0" y="0"/>
                 </a:moveTo>
@@ -5735,19 +6063,26 @@
           <a:blipFill>
             <a:blip r:embed="rId12"/>
             <a:stretch>
-              <a:fillRect l="0" t="0" r="0" b="0"/>
+              <a:fillRect/>
             </a:stretch>
           </a:blipFill>
         </p:spPr>
-      </p:sp>
-      <p:sp>
-        <p:nvSpPr>
-          <p:cNvPr name="Freeform 37" id="37"/>
+        <p:txBody>
+          <a:bodyPr/>
+          <a:lstStyle/>
+          <a:p>
+            <a:endParaRPr lang="es-CL"/>
+          </a:p>
+        </p:txBody>
+      </p:sp>
+      <p:sp>
+        <p:nvSpPr>
+          <p:cNvPr id="37" name="Freeform 37"/>
           <p:cNvSpPr/>
           <p:nvPr/>
         </p:nvSpPr>
         <p:spPr>
-          <a:xfrm flipH="false" flipV="false" rot="0">
+          <a:xfrm>
             <a:off x="14457103" y="6748783"/>
             <a:ext cx="952351" cy="981806"/>
           </a:xfrm>
@@ -5756,9 +6091,9 @@
             <a:gdLst/>
             <a:ahLst/>
             <a:cxnLst/>
-            <a:rect r="r" b="b" t="t" l="l"/>
+            <a:rect l="l" t="t" r="r" b="b"/>
             <a:pathLst>
-              <a:path h="981806" w="952351">
+              <a:path w="952351" h="981806">
                 <a:moveTo>
                   <a:pt x="0" y="0"/>
                 </a:moveTo>
@@ -5781,10 +6116,17 @@
           <a:blipFill>
             <a:blip r:embed="rId13"/>
             <a:stretch>
-              <a:fillRect l="0" t="0" r="0" b="0"/>
+              <a:fillRect/>
             </a:stretch>
           </a:blipFill>
         </p:spPr>
+        <p:txBody>
+          <a:bodyPr/>
+          <a:lstStyle/>
+          <a:p>
+            <a:endParaRPr lang="es-CL"/>
+          </a:p>
+        </p:txBody>
       </p:sp>
     </p:spTree>
   </p:cSld>
@@ -5795,7 +6137,7 @@
 </file>
 
 <file path=ppt/slides/slide5.xml><?xml version="1.0" encoding="utf-8"?>
-<p:sld xmlns:p="http://schemas.openxmlformats.org/presentationml/2006/main" xmlns:a="http://schemas.openxmlformats.org/drawingml/2006/main" xmlns:r="http://schemas.openxmlformats.org/officeDocument/2006/relationships">
+<p:sld xmlns:a="http://schemas.openxmlformats.org/drawingml/2006/main" xmlns:r="http://schemas.openxmlformats.org/officeDocument/2006/relationships" xmlns:p="http://schemas.openxmlformats.org/presentationml/2006/main">
   <p:cSld>
     <p:spTree>
       <p:nvGrpSpPr>
@@ -5813,12 +6155,12 @@
       </p:grpSpPr>
       <p:grpSp>
         <p:nvGrpSpPr>
-          <p:cNvPr name="Group 2" id="2"/>
+          <p:cNvPr id="2" name="Group 2"/>
           <p:cNvGrpSpPr/>
           <p:nvPr/>
         </p:nvGrpSpPr>
         <p:grpSpPr>
-          <a:xfrm rot="0">
+          <a:xfrm>
             <a:off x="11870713" y="0"/>
             <a:ext cx="6417287" cy="10287000"/>
             <a:chOff x="0" y="0"/>
@@ -5827,12 +6169,12 @@
         </p:grpSpPr>
         <p:sp>
           <p:nvSpPr>
-            <p:cNvPr name="Freeform 3" id="3"/>
+            <p:cNvPr id="3" name="Freeform 3"/>
             <p:cNvSpPr/>
             <p:nvPr/>
           </p:nvSpPr>
           <p:spPr>
-            <a:xfrm flipH="false" flipV="false" rot="0">
+            <a:xfrm>
               <a:off x="0" y="0"/>
               <a:ext cx="1193932" cy="1913890"/>
             </a:xfrm>
@@ -5841,9 +6183,9 @@
               <a:gdLst/>
               <a:ahLst/>
               <a:cxnLst/>
-              <a:rect r="r" b="b" t="t" l="l"/>
+              <a:rect l="l" t="t" r="r" b="b"/>
               <a:pathLst>
-                <a:path h="1913890" w="1193932">
+                <a:path w="1193932" h="1913890">
                   <a:moveTo>
                     <a:pt x="0" y="0"/>
                   </a:moveTo>
@@ -5864,16 +6206,23 @@
               <a:srgbClr val="00BF63"/>
             </a:solidFill>
           </p:spPr>
+          <p:txBody>
+            <a:bodyPr/>
+            <a:lstStyle/>
+            <a:p>
+              <a:endParaRPr lang="es-CL"/>
+            </a:p>
+          </p:txBody>
         </p:sp>
       </p:grpSp>
       <p:sp>
         <p:nvSpPr>
-          <p:cNvPr name="Freeform 4" id="4"/>
+          <p:cNvPr id="4" name="Freeform 4"/>
           <p:cNvSpPr/>
           <p:nvPr/>
         </p:nvSpPr>
         <p:spPr>
-          <a:xfrm flipH="false" flipV="false" rot="0">
+          <a:xfrm>
             <a:off x="11870713" y="2320908"/>
             <a:ext cx="5880061" cy="5858679"/>
           </a:xfrm>
@@ -5882,9 +6231,9 @@
             <a:gdLst/>
             <a:ahLst/>
             <a:cxnLst/>
-            <a:rect r="r" b="b" t="t" l="l"/>
+            <a:rect l="l" t="t" r="r" b="b"/>
             <a:pathLst>
-              <a:path h="5858679" w="5880061">
+              <a:path w="5880061" h="5858679">
                 <a:moveTo>
                   <a:pt x="0" y="0"/>
                 </a:moveTo>
@@ -5907,19 +6256,26 @@
           <a:blipFill>
             <a:blip r:embed="rId2"/>
             <a:stretch>
-              <a:fillRect l="0" t="0" r="0" b="0"/>
+              <a:fillRect/>
             </a:stretch>
           </a:blipFill>
         </p:spPr>
-      </p:sp>
-      <p:sp>
-        <p:nvSpPr>
-          <p:cNvPr name="TextBox 5" id="5"/>
-          <p:cNvSpPr txBox="true"/>
+        <p:txBody>
+          <a:bodyPr/>
+          <a:lstStyle/>
+          <a:p>
+            <a:endParaRPr lang="es-CL"/>
+          </a:p>
+        </p:txBody>
+      </p:sp>
+      <p:sp>
+        <p:nvSpPr>
+          <p:cNvPr id="5" name="TextBox 5"/>
+          <p:cNvSpPr txBox="1"/>
           <p:nvPr/>
         </p:nvSpPr>
         <p:spPr>
-          <a:xfrm rot="0">
+          <a:xfrm>
             <a:off x="315082" y="1655268"/>
             <a:ext cx="10987591" cy="1121729"/>
           </a:xfrm>
@@ -5928,12 +6284,12 @@
           </a:prstGeom>
         </p:spPr>
         <p:txBody>
-          <a:bodyPr anchor="t" rtlCol="false" tIns="0" lIns="0" bIns="0" rIns="0">
+          <a:bodyPr lIns="0" tIns="0" rIns="0" bIns="0" rtlCol="0" anchor="t">
             <a:spAutoFit/>
           </a:bodyPr>
           <a:lstStyle/>
           <a:p>
-            <a:pPr algn="ctr" marL="0" indent="0" lvl="0">
+            <a:pPr marL="0" lvl="0" indent="0" algn="ctr">
               <a:lnSpc>
                 <a:spcPts val="9480"/>
               </a:lnSpc>
@@ -5942,7 +6298,7 @@
               </a:spcBef>
             </a:pPr>
             <a:r>
-              <a:rPr lang="en-US" b="true" sz="6038">
+              <a:rPr lang="en-US" sz="6038" b="1">
                 <a:solidFill>
                   <a:srgbClr val="000000"/>
                 </a:solidFill>
@@ -5958,12 +6314,12 @@
       </p:sp>
       <p:sp>
         <p:nvSpPr>
-          <p:cNvPr name="TextBox 6" id="6"/>
-          <p:cNvSpPr txBox="true"/>
+          <p:cNvPr id="6" name="TextBox 6"/>
+          <p:cNvSpPr txBox="1"/>
           <p:nvPr/>
         </p:nvSpPr>
         <p:spPr>
-          <a:xfrm rot="0">
+          <a:xfrm>
             <a:off x="1086318" y="3596418"/>
             <a:ext cx="10304307" cy="4825764"/>
           </a:xfrm>
@@ -5972,12 +6328,12 @@
           </a:prstGeom>
         </p:spPr>
         <p:txBody>
-          <a:bodyPr anchor="t" rtlCol="false" tIns="0" lIns="0" bIns="0" rIns="0">
+          <a:bodyPr lIns="0" tIns="0" rIns="0" bIns="0" rtlCol="0" anchor="t">
             <a:spAutoFit/>
           </a:bodyPr>
           <a:lstStyle/>
           <a:p>
-            <a:pPr algn="l" marL="594174" indent="-297087" lvl="1">
+            <a:pPr marL="594174" lvl="1" indent="-297087" algn="l">
               <a:lnSpc>
                 <a:spcPts val="3852"/>
               </a:lnSpc>
@@ -5985,7 +6341,7 @@
               <a:buChar char="•"/>
             </a:pPr>
             <a:r>
-              <a:rPr lang="en-US" b="true" sz="2752">
+              <a:rPr lang="en-US" sz="2752" b="1">
                 <a:solidFill>
                   <a:srgbClr val="000000"/>
                 </a:solidFill>
@@ -6010,7 +6366,7 @@
             </a:r>
           </a:p>
           <a:p>
-            <a:pPr algn="l" marL="594174" indent="-297087" lvl="1">
+            <a:pPr marL="594174" lvl="1" indent="-297087" algn="l">
               <a:lnSpc>
                 <a:spcPts val="3852"/>
               </a:lnSpc>
@@ -6018,7 +6374,7 @@
               <a:buChar char="•"/>
             </a:pPr>
             <a:r>
-              <a:rPr lang="en-US" b="true" sz="2752">
+              <a:rPr lang="en-US" sz="2752" b="1">
                 <a:solidFill>
                   <a:srgbClr val="000000"/>
                 </a:solidFill>
@@ -6043,7 +6399,7 @@
             </a:r>
           </a:p>
           <a:p>
-            <a:pPr algn="l" marL="594174" indent="-297087" lvl="1">
+            <a:pPr marL="594174" lvl="1" indent="-297087" algn="l">
               <a:lnSpc>
                 <a:spcPts val="3852"/>
               </a:lnSpc>
@@ -6051,7 +6407,7 @@
               <a:buChar char="•"/>
             </a:pPr>
             <a:r>
-              <a:rPr lang="en-US" b="true" sz="2752">
+              <a:rPr lang="en-US" sz="2752" b="1">
                 <a:solidFill>
                   <a:srgbClr val="000000"/>
                 </a:solidFill>
@@ -6076,7 +6432,7 @@
             </a:r>
           </a:p>
           <a:p>
-            <a:pPr algn="l" marL="594174" indent="-297087" lvl="1">
+            <a:pPr marL="594174" lvl="1" indent="-297087" algn="l">
               <a:lnSpc>
                 <a:spcPts val="3852"/>
               </a:lnSpc>
@@ -6084,7 +6440,7 @@
               <a:buChar char="•"/>
             </a:pPr>
             <a:r>
-              <a:rPr lang="en-US" b="true" sz="2752">
+              <a:rPr lang="en-US" sz="2752" b="1">
                 <a:solidFill>
                   <a:srgbClr val="000000"/>
                 </a:solidFill>
@@ -6109,7 +6465,7 @@
             </a:r>
           </a:p>
           <a:p>
-            <a:pPr algn="l" marL="594174" indent="-297087" lvl="1">
+            <a:pPr marL="594174" lvl="1" indent="-297087" algn="l">
               <a:lnSpc>
                 <a:spcPts val="3852"/>
               </a:lnSpc>
@@ -6117,7 +6473,7 @@
               <a:buChar char="•"/>
             </a:pPr>
             <a:r>
-              <a:rPr lang="en-US" b="true" sz="2752">
+              <a:rPr lang="en-US" sz="2752" b="1">
                 <a:solidFill>
                   <a:srgbClr val="000000"/>
                 </a:solidFill>
@@ -6142,7 +6498,7 @@
             </a:r>
           </a:p>
           <a:p>
-            <a:pPr algn="l" marL="594174" indent="-297087" lvl="1">
+            <a:pPr marL="594174" lvl="1" indent="-297087" algn="l">
               <a:lnSpc>
                 <a:spcPts val="3852"/>
               </a:lnSpc>
@@ -6150,7 +6506,7 @@
               <a:buChar char="•"/>
             </a:pPr>
             <a:r>
-              <a:rPr lang="en-US" b="true" sz="2752">
+              <a:rPr lang="en-US" sz="2752" b="1">
                 <a:solidFill>
                   <a:srgbClr val="000000"/>
                 </a:solidFill>
@@ -6185,7 +6541,7 @@
 </file>
 
 <file path=ppt/slides/slide6.xml><?xml version="1.0" encoding="utf-8"?>
-<p:sld xmlns:p="http://schemas.openxmlformats.org/presentationml/2006/main" xmlns:a="http://schemas.openxmlformats.org/drawingml/2006/main" xmlns:r="http://schemas.openxmlformats.org/officeDocument/2006/relationships">
+<p:sld xmlns:a="http://schemas.openxmlformats.org/drawingml/2006/main" xmlns:r="http://schemas.openxmlformats.org/officeDocument/2006/relationships" xmlns:p="http://schemas.openxmlformats.org/presentationml/2006/main">
   <p:cSld>
     <p:spTree>
       <p:nvGrpSpPr>
@@ -6203,12 +6559,12 @@
       </p:grpSpPr>
       <p:grpSp>
         <p:nvGrpSpPr>
-          <p:cNvPr name="Group 2" id="2"/>
+          <p:cNvPr id="2" name="Group 2"/>
           <p:cNvGrpSpPr/>
           <p:nvPr/>
         </p:nvGrpSpPr>
         <p:grpSpPr>
-          <a:xfrm rot="0">
+          <a:xfrm>
             <a:off x="14302718" y="0"/>
             <a:ext cx="3985282" cy="10287000"/>
             <a:chOff x="0" y="0"/>
@@ -6217,12 +6573,12 @@
         </p:grpSpPr>
         <p:sp>
           <p:nvSpPr>
-            <p:cNvPr name="Freeform 3" id="3"/>
+            <p:cNvPr id="3" name="Freeform 3"/>
             <p:cNvSpPr/>
             <p:nvPr/>
           </p:nvSpPr>
           <p:spPr>
-            <a:xfrm flipH="false" flipV="false" rot="0">
+            <a:xfrm>
               <a:off x="0" y="0"/>
               <a:ext cx="741459" cy="1913890"/>
             </a:xfrm>
@@ -6231,9 +6587,9 @@
               <a:gdLst/>
               <a:ahLst/>
               <a:cxnLst/>
-              <a:rect r="r" b="b" t="t" l="l"/>
+              <a:rect l="l" t="t" r="r" b="b"/>
               <a:pathLst>
-                <a:path h="1913890" w="741459">
+                <a:path w="741459" h="1913890">
                   <a:moveTo>
                     <a:pt x="0" y="0"/>
                   </a:moveTo>
@@ -6250,7 +6606,7 @@
                 </a:path>
               </a:pathLst>
             </a:custGeom>
-            <a:gradFill rotWithShape="true">
+            <a:gradFill rotWithShape="1">
               <a:gsLst>
                 <a:gs pos="0">
                   <a:srgbClr val="7B2D9F">
@@ -6266,18 +6622,25 @@
               <a:lin ang="5400000"/>
             </a:gradFill>
           </p:spPr>
+          <p:txBody>
+            <a:bodyPr/>
+            <a:lstStyle/>
+            <a:p>
+              <a:endParaRPr lang="es-CL"/>
+            </a:p>
+          </p:txBody>
         </p:sp>
       </p:grpSp>
       <p:grpSp>
         <p:nvGrpSpPr>
-          <p:cNvPr name="Group 4" id="4"/>
+          <p:cNvPr id="4" name="Group 4"/>
           <p:cNvGrpSpPr>
-            <a:grpSpLocks noChangeAspect="true"/>
+            <a:grpSpLocks noChangeAspect="1"/>
           </p:cNvGrpSpPr>
           <p:nvPr/>
         </p:nvGrpSpPr>
         <p:grpSpPr>
-          <a:xfrm rot="0">
+          <a:xfrm>
             <a:off x="10984928" y="1685890"/>
             <a:ext cx="6655684" cy="6655657"/>
             <a:chOff x="0" y="0"/>
@@ -6286,12 +6649,12 @@
         </p:grpSpPr>
         <p:sp>
           <p:nvSpPr>
-            <p:cNvPr name="Freeform 5" id="5"/>
+            <p:cNvPr id="5" name="Freeform 5"/>
             <p:cNvSpPr/>
             <p:nvPr/>
           </p:nvSpPr>
           <p:spPr>
-            <a:xfrm flipH="false" flipV="false" rot="0">
+            <a:xfrm>
               <a:off x="0" y="0"/>
               <a:ext cx="6350026" cy="6350000"/>
             </a:xfrm>
@@ -6300,9 +6663,9 @@
               <a:gdLst/>
               <a:ahLst/>
               <a:cxnLst/>
-              <a:rect r="r" b="b" t="t" l="l"/>
+              <a:rect l="l" t="t" r="r" b="b"/>
               <a:pathLst>
-                <a:path h="6350000" w="6350026">
+                <a:path w="6350026" h="6350000">
                   <a:moveTo>
                     <a:pt x="0" y="0"/>
                   </a:moveTo>
@@ -6322,20 +6685,27 @@
             <a:blipFill>
               <a:blip r:embed="rId2"/>
               <a:stretch>
-                <a:fillRect l="-32502" t="0" r="-17496" b="0"/>
+                <a:fillRect l="-32502" r="-17496"/>
               </a:stretch>
             </a:blipFill>
           </p:spPr>
+          <p:txBody>
+            <a:bodyPr/>
+            <a:lstStyle/>
+            <a:p>
+              <a:endParaRPr lang="es-CL"/>
+            </a:p>
+          </p:txBody>
         </p:sp>
       </p:grpSp>
       <p:sp>
         <p:nvSpPr>
-          <p:cNvPr name="TextBox 6" id="6"/>
-          <p:cNvSpPr txBox="true"/>
+          <p:cNvPr id="6" name="TextBox 6"/>
+          <p:cNvSpPr txBox="1"/>
           <p:nvPr/>
         </p:nvSpPr>
         <p:spPr>
-          <a:xfrm rot="0">
+          <a:xfrm>
             <a:off x="493149" y="1048797"/>
             <a:ext cx="7953414" cy="1074161"/>
           </a:xfrm>
@@ -6344,12 +6714,12 @@
           </a:prstGeom>
         </p:spPr>
         <p:txBody>
-          <a:bodyPr anchor="t" rtlCol="false" tIns="0" lIns="0" bIns="0" rIns="0">
+          <a:bodyPr lIns="0" tIns="0" rIns="0" bIns="0" rtlCol="0" anchor="t">
             <a:spAutoFit/>
           </a:bodyPr>
           <a:lstStyle/>
           <a:p>
-            <a:pPr algn="ctr" marL="0" indent="0" lvl="0">
+            <a:pPr marL="0" lvl="0" indent="0" algn="ctr">
               <a:lnSpc>
                 <a:spcPts val="9085"/>
               </a:lnSpc>
@@ -6358,7 +6728,7 @@
               </a:spcBef>
             </a:pPr>
             <a:r>
-              <a:rPr lang="en-US" b="true" sz="5786">
+              <a:rPr lang="en-US" sz="5786" b="1">
                 <a:solidFill>
                   <a:srgbClr val="000000"/>
                 </a:solidFill>
@@ -6374,33 +6744,33 @@
       </p:sp>
       <p:sp>
         <p:nvSpPr>
-          <p:cNvPr name="TextBox 7" id="7"/>
-          <p:cNvSpPr txBox="true"/>
+          <p:cNvPr id="7" name="TextBox 7"/>
+          <p:cNvSpPr txBox="1"/>
           <p:nvPr/>
         </p:nvSpPr>
         <p:spPr>
-          <a:xfrm rot="0">
+          <a:xfrm>
             <a:off x="493149" y="2744669"/>
-            <a:ext cx="10491779" cy="5140022"/>
+            <a:ext cx="10491779" cy="5201039"/>
           </a:xfrm>
           <a:prstGeom prst="rect">
             <a:avLst/>
           </a:prstGeom>
         </p:spPr>
         <p:txBody>
-          <a:bodyPr anchor="t" rtlCol="false" tIns="0" lIns="0" bIns="0" rIns="0">
+          <a:bodyPr lIns="0" tIns="0" rIns="0" bIns="0" rtlCol="0" anchor="t">
             <a:spAutoFit/>
           </a:bodyPr>
           <a:lstStyle/>
           <a:p>
-            <a:pPr algn="l" marL="530619" indent="-265310" lvl="1">
+            <a:pPr marL="530619" lvl="1" indent="-265310">
               <a:lnSpc>
                 <a:spcPts val="3440"/>
               </a:lnSpc>
-              <a:buAutoNum type="arabicPeriod" startAt="1"/>
+              <a:buAutoNum type="arabicPeriod"/>
             </a:pPr>
             <a:r>
-              <a:rPr lang="en-US" b="true" sz="2457">
+              <a:rPr lang="en-US" sz="2457" b="1" dirty="0">
                 <a:solidFill>
                   <a:srgbClr val="000000"/>
                 </a:solidFill>
@@ -6409,7 +6779,7 @@
                 <a:cs typeface="Montserrat Bold"/>
                 <a:sym typeface="Montserrat Bold"/>
               </a:rPr>
-              <a:t>Frontend Developer: Luis Olivarez</a:t>
+              <a:t>Luis Olivarez: Frontend Developer</a:t>
             </a:r>
           </a:p>
           <a:p>
@@ -6419,7 +6789,7 @@
               </a:lnSpc>
             </a:pPr>
             <a:r>
-              <a:rPr lang="en-US" sz="2457" b="true">
+              <a:rPr lang="en-US" sz="2457" b="1" dirty="0">
                 <a:solidFill>
                   <a:srgbClr val="000000"/>
                 </a:solidFill>
@@ -6431,7 +6801,7 @@
               <a:t>                  </a:t>
             </a:r>
             <a:r>
-              <a:rPr lang="en-US" sz="2457">
+              <a:rPr lang="en-US" sz="2457" dirty="0">
                 <a:solidFill>
                   <a:srgbClr val="000000"/>
                 </a:solidFill>
@@ -6440,7 +6810,103 @@
                 <a:cs typeface="Montserrat"/>
                 <a:sym typeface="Montserrat"/>
               </a:rPr>
-              <a:t>  - Diseño de interfaz y experiencia de usuario (UX/UI).</a:t>
+              <a:t>  - </a:t>
+            </a:r>
+            <a:r>
+              <a:rPr lang="en-US" sz="2457" dirty="0" err="1">
+                <a:solidFill>
+                  <a:srgbClr val="000000"/>
+                </a:solidFill>
+                <a:latin typeface="Montserrat"/>
+                <a:ea typeface="Montserrat"/>
+                <a:cs typeface="Montserrat"/>
+                <a:sym typeface="Montserrat"/>
+              </a:rPr>
+              <a:t>Diseño</a:t>
+            </a:r>
+            <a:r>
+              <a:rPr lang="en-US" sz="2457" dirty="0">
+                <a:solidFill>
+                  <a:srgbClr val="000000"/>
+                </a:solidFill>
+                <a:latin typeface="Montserrat"/>
+                <a:ea typeface="Montserrat"/>
+                <a:cs typeface="Montserrat"/>
+                <a:sym typeface="Montserrat"/>
+              </a:rPr>
+              <a:t> de </a:t>
+            </a:r>
+            <a:r>
+              <a:rPr lang="en-US" sz="2457" dirty="0" err="1">
+                <a:solidFill>
+                  <a:srgbClr val="000000"/>
+                </a:solidFill>
+                <a:latin typeface="Montserrat"/>
+                <a:ea typeface="Montserrat"/>
+                <a:cs typeface="Montserrat"/>
+                <a:sym typeface="Montserrat"/>
+              </a:rPr>
+              <a:t>interfaz</a:t>
+            </a:r>
+            <a:r>
+              <a:rPr lang="en-US" sz="2457" dirty="0">
+                <a:solidFill>
+                  <a:srgbClr val="000000"/>
+                </a:solidFill>
+                <a:latin typeface="Montserrat"/>
+                <a:ea typeface="Montserrat"/>
+                <a:cs typeface="Montserrat"/>
+                <a:sym typeface="Montserrat"/>
+              </a:rPr>
+              <a:t> y </a:t>
+            </a:r>
+            <a:r>
+              <a:rPr lang="en-US" sz="2457" dirty="0" err="1">
+                <a:solidFill>
+                  <a:srgbClr val="000000"/>
+                </a:solidFill>
+                <a:latin typeface="Montserrat"/>
+                <a:ea typeface="Montserrat"/>
+                <a:cs typeface="Montserrat"/>
+                <a:sym typeface="Montserrat"/>
+              </a:rPr>
+              <a:t>experiencia</a:t>
+            </a:r>
+            <a:r>
+              <a:rPr lang="en-US" sz="2457" dirty="0">
+                <a:solidFill>
+                  <a:srgbClr val="000000"/>
+                </a:solidFill>
+                <a:latin typeface="Montserrat"/>
+                <a:ea typeface="Montserrat"/>
+                <a:cs typeface="Montserrat"/>
+                <a:sym typeface="Montserrat"/>
+              </a:rPr>
+              <a:t> de </a:t>
+            </a:r>
+            <a:r>
+              <a:rPr lang="en-US" sz="2457" dirty="0" err="1">
+                <a:solidFill>
+                  <a:srgbClr val="000000"/>
+                </a:solidFill>
+                <a:latin typeface="Montserrat"/>
+                <a:ea typeface="Montserrat"/>
+                <a:cs typeface="Montserrat"/>
+                <a:sym typeface="Montserrat"/>
+              </a:rPr>
+              <a:t>usuario</a:t>
+            </a:r>
+            <a:r>
+              <a:rPr lang="en-US" sz="2457" dirty="0">
+                <a:solidFill>
+                  <a:srgbClr val="000000"/>
+                </a:solidFill>
+                <a:latin typeface="Montserrat"/>
+                <a:ea typeface="Montserrat"/>
+                <a:cs typeface="Montserrat"/>
+                <a:sym typeface="Montserrat"/>
+              </a:rPr>
+              <a:t> (UX/UI).</a:t>
             </a:r>
           </a:p>
           <a:p>
@@ -6450,7 +6916,7 @@
               </a:lnSpc>
             </a:pPr>
             <a:r>
-              <a:rPr lang="en-US" sz="2457">
+              <a:rPr lang="en-US" sz="2457" dirty="0">
                 <a:solidFill>
                   <a:srgbClr val="000000"/>
                 </a:solidFill>
@@ -6459,7 +6925,31 @@
                 <a:cs typeface="Montserrat"/>
                 <a:sym typeface="Montserrat"/>
               </a:rPr>
-              <a:t>                     - Implementación con react.js + Tailwind</a:t>
+              <a:t>                     - </a:t>
+            </a:r>
+            <a:r>
+              <a:rPr lang="en-US" sz="2457" dirty="0" err="1">
+                <a:solidFill>
+                  <a:srgbClr val="000000"/>
+                </a:solidFill>
+                <a:latin typeface="Montserrat"/>
+                <a:ea typeface="Montserrat"/>
+                <a:cs typeface="Montserrat"/>
+                <a:sym typeface="Montserrat"/>
+              </a:rPr>
+              <a:t>Implementación</a:t>
+            </a:r>
+            <a:r>
+              <a:rPr lang="en-US" sz="2457" dirty="0">
+                <a:solidFill>
+                  <a:srgbClr val="000000"/>
+                </a:solidFill>
+                <a:latin typeface="Montserrat"/>
+                <a:ea typeface="Montserrat"/>
+                <a:cs typeface="Montserrat"/>
+                <a:sym typeface="Montserrat"/>
+              </a:rPr>
+              <a:t> con react.js + Tailwind</a:t>
             </a:r>
           </a:p>
           <a:p>
@@ -6468,6 +6958,48 @@
                 <a:spcPts val="3440"/>
               </a:lnSpc>
             </a:pPr>
+            <a:endParaRPr lang="en-US" sz="2457" dirty="0">
+              <a:solidFill>
+                <a:srgbClr val="000000"/>
+              </a:solidFill>
+              <a:latin typeface="Montserrat"/>
+              <a:ea typeface="Montserrat"/>
+              <a:cs typeface="Montserrat"/>
+              <a:sym typeface="Montserrat"/>
+            </a:endParaRPr>
+          </a:p>
+          <a:p>
+            <a:pPr marL="265309" lvl="1">
+              <a:lnSpc>
+                <a:spcPts val="3440"/>
+              </a:lnSpc>
+            </a:pPr>
+            <a:r>
+              <a:rPr lang="en-US" sz="2457" b="1" dirty="0">
+                <a:solidFill>
+                  <a:srgbClr val="000000"/>
+                </a:solidFill>
+                <a:latin typeface="Montserrat Bold"/>
+                <a:sym typeface="Montserrat Bold"/>
+              </a:rPr>
+              <a:t>2. Martín Orellana: Backend Developer y Product </a:t>
+            </a:r>
+            <a:r>
+              <a:rPr lang="es-CL" sz="2457" b="1" dirty="0" err="1">
+                <a:solidFill>
+                  <a:srgbClr val="000000"/>
+                </a:solidFill>
+                <a:latin typeface="Montserrat Bold"/>
+              </a:rPr>
+              <a:t>Owner</a:t>
+            </a:r>
+            <a:endParaRPr lang="en-US" sz="2457" b="1" dirty="0">
+              <a:solidFill>
+                <a:srgbClr val="000000"/>
+              </a:solidFill>
+              <a:latin typeface="Montserrat Bold"/>
+              <a:sym typeface="Montserrat Bold"/>
+            </a:endParaRPr>
           </a:p>
           <a:p>
             <a:pPr algn="l">
@@ -6476,7 +7008,19 @@
               </a:lnSpc>
             </a:pPr>
             <a:r>
-              <a:rPr lang="en-US" sz="2457">
+              <a:rPr lang="en-US" sz="2457" b="1" dirty="0">
+                <a:solidFill>
+                  <a:srgbClr val="000000"/>
+                </a:solidFill>
+                <a:latin typeface="Montserrat Bold"/>
+                <a:ea typeface="Montserrat Bold"/>
+                <a:cs typeface="Montserrat Bold"/>
+                <a:sym typeface="Montserrat Bold"/>
+              </a:rPr>
+              <a:t>                     - </a:t>
+            </a:r>
+            <a:r>
+              <a:rPr lang="en-US" sz="2457" dirty="0">
                 <a:solidFill>
                   <a:srgbClr val="000000"/>
                 </a:solidFill>
@@ -6485,10 +7029,10 @@
                 <a:cs typeface="Montserrat"/>
                 <a:sym typeface="Montserrat"/>
               </a:rPr>
-              <a:t>    </a:t>
-            </a:r>
-            <a:r>
-              <a:rPr lang="en-US" sz="2457">
+              <a:t>Desarrollo de API </a:t>
+            </a:r>
+            <a:r>
+              <a:rPr lang="en-US" sz="2457" dirty="0" err="1">
                 <a:solidFill>
                   <a:srgbClr val="000000"/>
                 </a:solidFill>
@@ -6497,19 +7041,19 @@
                 <a:cs typeface="Montserrat"/>
                 <a:sym typeface="Montserrat"/>
               </a:rPr>
-              <a:t>2. </a:t>
-            </a:r>
-            <a:r>
-              <a:rPr lang="en-US" sz="2457" b="true">
-                <a:solidFill>
-                  <a:srgbClr val="000000"/>
-                </a:solidFill>
-                <a:latin typeface="Montserrat Bold"/>
-                <a:ea typeface="Montserrat Bold"/>
-                <a:cs typeface="Montserrat Bold"/>
-                <a:sym typeface="Montserrat Bold"/>
-              </a:rPr>
-              <a:t>Backend Developer: Martín Orellana</a:t>
+              <a:t>en</a:t>
+            </a:r>
+            <a:r>
+              <a:rPr lang="en-US" sz="2457" dirty="0">
+                <a:solidFill>
+                  <a:srgbClr val="000000"/>
+                </a:solidFill>
+                <a:latin typeface="Montserrat"/>
+                <a:ea typeface="Montserrat"/>
+                <a:cs typeface="Montserrat"/>
+                <a:sym typeface="Montserrat"/>
+              </a:rPr>
+              <a:t> Django</a:t>
             </a:r>
           </a:p>
           <a:p>
@@ -6519,19 +7063,7 @@
               </a:lnSpc>
             </a:pPr>
             <a:r>
-              <a:rPr lang="en-US" sz="2457" b="true">
-                <a:solidFill>
-                  <a:srgbClr val="000000"/>
-                </a:solidFill>
-                <a:latin typeface="Montserrat Bold"/>
-                <a:ea typeface="Montserrat Bold"/>
-                <a:cs typeface="Montserrat Bold"/>
-                <a:sym typeface="Montserrat Bold"/>
-              </a:rPr>
-              <a:t>                     - </a:t>
-            </a:r>
-            <a:r>
-              <a:rPr lang="en-US" sz="2457">
+              <a:rPr lang="en-US" sz="2457" dirty="0">
                 <a:solidFill>
                   <a:srgbClr val="000000"/>
                 </a:solidFill>
@@ -6540,7 +7072,79 @@
                 <a:cs typeface="Montserrat"/>
                 <a:sym typeface="Montserrat"/>
               </a:rPr>
-              <a:t>Desarrollo de API en Django</a:t>
+              <a:t>                       - </a:t>
+            </a:r>
+            <a:r>
+              <a:rPr lang="en-US" sz="2457" dirty="0" err="1">
+                <a:solidFill>
+                  <a:srgbClr val="000000"/>
+                </a:solidFill>
+                <a:latin typeface="Montserrat"/>
+                <a:ea typeface="Montserrat"/>
+                <a:cs typeface="Montserrat"/>
+                <a:sym typeface="Montserrat"/>
+              </a:rPr>
+              <a:t>Seguridad</a:t>
+            </a:r>
+            <a:r>
+              <a:rPr lang="en-US" sz="2457" dirty="0">
+                <a:solidFill>
+                  <a:srgbClr val="000000"/>
+                </a:solidFill>
+                <a:latin typeface="Montserrat"/>
+                <a:ea typeface="Montserrat"/>
+                <a:cs typeface="Montserrat"/>
+                <a:sym typeface="Montserrat"/>
+              </a:rPr>
+              <a:t>, </a:t>
+            </a:r>
+            <a:r>
+              <a:rPr lang="en-US" sz="2457" dirty="0" err="1">
+                <a:solidFill>
+                  <a:srgbClr val="000000"/>
+                </a:solidFill>
+                <a:latin typeface="Montserrat"/>
+                <a:ea typeface="Montserrat"/>
+                <a:cs typeface="Montserrat"/>
+                <a:sym typeface="Montserrat"/>
+              </a:rPr>
+              <a:t>autenticación</a:t>
+            </a:r>
+            <a:r>
+              <a:rPr lang="en-US" sz="2457" dirty="0">
+                <a:solidFill>
+                  <a:srgbClr val="000000"/>
+                </a:solidFill>
+                <a:latin typeface="Montserrat"/>
+                <a:ea typeface="Montserrat"/>
+                <a:cs typeface="Montserrat"/>
+                <a:sym typeface="Montserrat"/>
+              </a:rPr>
+              <a:t> y </a:t>
+            </a:r>
+            <a:r>
+              <a:rPr lang="en-US" sz="2457" dirty="0" err="1">
+                <a:solidFill>
+                  <a:srgbClr val="000000"/>
+                </a:solidFill>
+                <a:latin typeface="Montserrat"/>
+                <a:ea typeface="Montserrat"/>
+                <a:cs typeface="Montserrat"/>
+                <a:sym typeface="Montserrat"/>
+              </a:rPr>
+              <a:t>conexión</a:t>
+            </a:r>
+            <a:r>
+              <a:rPr lang="en-US" sz="2457" dirty="0">
+                <a:solidFill>
+                  <a:srgbClr val="000000"/>
+                </a:solidFill>
+                <a:latin typeface="Montserrat"/>
+                <a:ea typeface="Montserrat"/>
+                <a:cs typeface="Montserrat"/>
+                <a:sym typeface="Montserrat"/>
+              </a:rPr>
+              <a:t> con BD.</a:t>
             </a:r>
           </a:p>
           <a:p>
@@ -6549,18 +7153,15 @@
                 <a:spcPts val="3440"/>
               </a:lnSpc>
             </a:pPr>
-            <a:r>
-              <a:rPr lang="en-US" sz="2457">
-                <a:solidFill>
-                  <a:srgbClr val="000000"/>
-                </a:solidFill>
-                <a:latin typeface="Montserrat"/>
-                <a:ea typeface="Montserrat"/>
-                <a:cs typeface="Montserrat"/>
-                <a:sym typeface="Montserrat"/>
-              </a:rPr>
-              <a:t>                       - Seguridad, autenticación y conexión con BD.</a:t>
-            </a:r>
+            <a:endParaRPr lang="en-US" sz="2457" dirty="0">
+              <a:solidFill>
+                <a:srgbClr val="000000"/>
+              </a:solidFill>
+              <a:latin typeface="Montserrat"/>
+              <a:ea typeface="Montserrat"/>
+              <a:cs typeface="Montserrat"/>
+              <a:sym typeface="Montserrat"/>
+            </a:endParaRPr>
           </a:p>
           <a:p>
             <a:pPr algn="l">
@@ -6568,6 +7169,38 @@
                 <a:spcPts val="3440"/>
               </a:lnSpc>
             </a:pPr>
+            <a:r>
+              <a:rPr lang="en-US" sz="2457" dirty="0">
+                <a:solidFill>
+                  <a:srgbClr val="000000"/>
+                </a:solidFill>
+                <a:latin typeface="Montserrat"/>
+                <a:ea typeface="Montserrat"/>
+                <a:cs typeface="Montserrat"/>
+                <a:sym typeface="Montserrat"/>
+              </a:rPr>
+              <a:t>    </a:t>
+            </a:r>
+            <a:r>
+              <a:rPr lang="en-US" sz="2457" b="1" dirty="0">
+                <a:solidFill>
+                  <a:srgbClr val="000000"/>
+                </a:solidFill>
+                <a:latin typeface="Montserrat Bold"/>
+                <a:sym typeface="Montserrat"/>
+              </a:rPr>
+              <a:t>3. </a:t>
+            </a:r>
+            <a:r>
+              <a:rPr lang="en-US" sz="2457" b="1" dirty="0">
+                <a:solidFill>
+                  <a:srgbClr val="000000"/>
+                </a:solidFill>
+                <a:latin typeface="Montserrat Bold"/>
+                <a:sym typeface="Montserrat Bold"/>
+              </a:rPr>
+              <a:t>Sebastian Gallardo: IA Developer y Scrum Master</a:t>
+            </a:r>
           </a:p>
           <a:p>
             <a:pPr algn="l">
@@ -6576,7 +7209,19 @@
               </a:lnSpc>
             </a:pPr>
             <a:r>
-              <a:rPr lang="en-US" sz="2457">
+              <a:rPr lang="en-US" sz="2457" b="1" dirty="0">
+                <a:solidFill>
+                  <a:srgbClr val="000000"/>
+                </a:solidFill>
+                <a:latin typeface="Montserrat Bold"/>
+                <a:ea typeface="Montserrat Bold"/>
+                <a:cs typeface="Montserrat Bold"/>
+                <a:sym typeface="Montserrat Bold"/>
+              </a:rPr>
+              <a:t>                      </a:t>
+            </a:r>
+            <a:r>
+              <a:rPr lang="en-US" sz="2457" dirty="0">
                 <a:solidFill>
                   <a:srgbClr val="000000"/>
                 </a:solidFill>
@@ -6585,19 +7230,103 @@
                 <a:cs typeface="Montserrat"/>
                 <a:sym typeface="Montserrat"/>
               </a:rPr>
-              <a:t>    3. </a:t>
-            </a:r>
-            <a:r>
-              <a:rPr lang="en-US" sz="2457" b="true">
-                <a:solidFill>
-                  <a:srgbClr val="000000"/>
-                </a:solidFill>
-                <a:latin typeface="Montserrat Bold"/>
-                <a:ea typeface="Montserrat Bold"/>
-                <a:cs typeface="Montserrat Bold"/>
-                <a:sym typeface="Montserrat Bold"/>
-              </a:rPr>
-              <a:t>AI Specialist / Data Engineer: Sebastian Gallardo</a:t>
+              <a:t>- </a:t>
+            </a:r>
+            <a:r>
+              <a:rPr lang="en-US" sz="2457" dirty="0" err="1">
+                <a:solidFill>
+                  <a:srgbClr val="000000"/>
+                </a:solidFill>
+                <a:latin typeface="Montserrat"/>
+                <a:ea typeface="Montserrat"/>
+                <a:cs typeface="Montserrat"/>
+                <a:sym typeface="Montserrat"/>
+              </a:rPr>
+              <a:t>Procesamiento</a:t>
+            </a:r>
+            <a:r>
+              <a:rPr lang="en-US" sz="2457" dirty="0">
+                <a:solidFill>
+                  <a:srgbClr val="000000"/>
+                </a:solidFill>
+                <a:latin typeface="Montserrat"/>
+                <a:ea typeface="Montserrat"/>
+                <a:cs typeface="Montserrat"/>
+                <a:sym typeface="Montserrat"/>
+              </a:rPr>
+              <a:t> de </a:t>
+            </a:r>
+            <a:r>
+              <a:rPr lang="en-US" sz="2457" dirty="0" err="1">
+                <a:solidFill>
+                  <a:srgbClr val="000000"/>
+                </a:solidFill>
+                <a:latin typeface="Montserrat"/>
+                <a:ea typeface="Montserrat"/>
+                <a:cs typeface="Montserrat"/>
+                <a:sym typeface="Montserrat"/>
+              </a:rPr>
+              <a:t>texto</a:t>
+            </a:r>
+            <a:r>
+              <a:rPr lang="en-US" sz="2457" dirty="0">
+                <a:solidFill>
+                  <a:srgbClr val="000000"/>
+                </a:solidFill>
+                <a:latin typeface="Montserrat"/>
+                <a:ea typeface="Montserrat"/>
+                <a:cs typeface="Montserrat"/>
+                <a:sym typeface="Montserrat"/>
+              </a:rPr>
+              <a:t> con </a:t>
+            </a:r>
+            <a:r>
+              <a:rPr lang="en-US" sz="2457" dirty="0" err="1">
+                <a:solidFill>
+                  <a:srgbClr val="000000"/>
+                </a:solidFill>
+                <a:latin typeface="Montserrat"/>
+                <a:ea typeface="Montserrat"/>
+                <a:cs typeface="Montserrat"/>
+                <a:sym typeface="Montserrat"/>
+              </a:rPr>
+              <a:t>modelos</a:t>
+            </a:r>
+            <a:r>
+              <a:rPr lang="en-US" sz="2457" dirty="0">
+                <a:solidFill>
+                  <a:srgbClr val="000000"/>
+                </a:solidFill>
+                <a:latin typeface="Montserrat"/>
+                <a:ea typeface="Montserrat"/>
+                <a:cs typeface="Montserrat"/>
+                <a:sym typeface="Montserrat"/>
+              </a:rPr>
+              <a:t> de </a:t>
+            </a:r>
+            <a:r>
+              <a:rPr lang="en-US" sz="2457" dirty="0" err="1">
+                <a:solidFill>
+                  <a:srgbClr val="000000"/>
+                </a:solidFill>
+                <a:latin typeface="Montserrat"/>
+                <a:ea typeface="Montserrat"/>
+                <a:cs typeface="Montserrat"/>
+                <a:sym typeface="Montserrat"/>
+              </a:rPr>
+              <a:t>lenguaje</a:t>
+            </a:r>
+            <a:r>
+              <a:rPr lang="en-US" sz="2457" dirty="0">
+                <a:solidFill>
+                  <a:srgbClr val="000000"/>
+                </a:solidFill>
+                <a:latin typeface="Montserrat"/>
+                <a:ea typeface="Montserrat"/>
+                <a:cs typeface="Montserrat"/>
+                <a:sym typeface="Montserrat"/>
+              </a:rPr>
+              <a:t>.</a:t>
             </a:r>
           </a:p>
           <a:p>
@@ -6607,19 +7336,7 @@
               </a:lnSpc>
             </a:pPr>
             <a:r>
-              <a:rPr lang="en-US" sz="2457" b="true">
-                <a:solidFill>
-                  <a:srgbClr val="000000"/>
-                </a:solidFill>
-                <a:latin typeface="Montserrat Bold"/>
-                <a:ea typeface="Montserrat Bold"/>
-                <a:cs typeface="Montserrat Bold"/>
-                <a:sym typeface="Montserrat Bold"/>
-              </a:rPr>
-              <a:t>                      </a:t>
-            </a:r>
-            <a:r>
-              <a:rPr lang="en-US" sz="2457">
+              <a:rPr lang="en-US" sz="2457" dirty="0">
                 <a:solidFill>
                   <a:srgbClr val="000000"/>
                 </a:solidFill>
@@ -6628,8 +7345,77 @@
                 <a:cs typeface="Montserrat"/>
                 <a:sym typeface="Montserrat"/>
               </a:rPr>
-              <a:t>- Procesamiento de texto con modelos de lenguaje.</a:t>
-            </a:r>
+              <a:t>                        - Generación de </a:t>
+            </a:r>
+            <a:r>
+              <a:rPr lang="en-US" sz="2457" dirty="0" err="1">
+                <a:solidFill>
+                  <a:srgbClr val="000000"/>
+                </a:solidFill>
+                <a:latin typeface="Montserrat"/>
+                <a:ea typeface="Montserrat"/>
+                <a:cs typeface="Montserrat"/>
+                <a:sym typeface="Montserrat"/>
+              </a:rPr>
+              <a:t>resúmenes</a:t>
+            </a:r>
+            <a:r>
+              <a:rPr lang="en-US" sz="2457" dirty="0">
+                <a:solidFill>
+                  <a:srgbClr val="000000"/>
+                </a:solidFill>
+                <a:latin typeface="Montserrat"/>
+                <a:ea typeface="Montserrat"/>
+                <a:cs typeface="Montserrat"/>
+                <a:sym typeface="Montserrat"/>
+              </a:rPr>
+              <a:t> y </a:t>
+            </a:r>
+            <a:r>
+              <a:rPr lang="en-US" sz="2457" dirty="0" err="1">
+                <a:solidFill>
+                  <a:srgbClr val="000000"/>
+                </a:solidFill>
+                <a:latin typeface="Montserrat"/>
+                <a:ea typeface="Montserrat"/>
+                <a:cs typeface="Montserrat"/>
+                <a:sym typeface="Montserrat"/>
+              </a:rPr>
+              <a:t>evaluaciones</a:t>
+            </a:r>
+            <a:r>
+              <a:rPr lang="en-US" sz="2457" dirty="0">
+                <a:solidFill>
+                  <a:srgbClr val="000000"/>
+                </a:solidFill>
+                <a:latin typeface="Montserrat"/>
+                <a:ea typeface="Montserrat"/>
+                <a:cs typeface="Montserrat"/>
+                <a:sym typeface="Montserrat"/>
+              </a:rPr>
+              <a:t> </a:t>
+            </a:r>
+            <a:r>
+              <a:rPr lang="en-US" sz="2457" dirty="0" err="1">
+                <a:solidFill>
+                  <a:srgbClr val="000000"/>
+                </a:solidFill>
+                <a:latin typeface="Montserrat"/>
+                <a:ea typeface="Montserrat"/>
+                <a:cs typeface="Montserrat"/>
+                <a:sym typeface="Montserrat"/>
+              </a:rPr>
+              <a:t>adaptivas</a:t>
+            </a:r>
+            <a:endParaRPr lang="en-US" sz="2457" dirty="0">
+              <a:solidFill>
+                <a:srgbClr val="000000"/>
+              </a:solidFill>
+              <a:latin typeface="Montserrat"/>
+              <a:ea typeface="Montserrat"/>
+              <a:cs typeface="Montserrat"/>
+              <a:sym typeface="Montserrat"/>
+            </a:endParaRPr>
           </a:p>
           <a:p>
             <a:pPr algn="l">
@@ -6637,25 +7423,15 @@
                 <a:spcPts val="3440"/>
               </a:lnSpc>
             </a:pPr>
-            <a:r>
-              <a:rPr lang="en-US" sz="2457">
-                <a:solidFill>
-                  <a:srgbClr val="000000"/>
-                </a:solidFill>
-                <a:latin typeface="Montserrat"/>
-                <a:ea typeface="Montserrat"/>
-                <a:cs typeface="Montserrat"/>
-                <a:sym typeface="Montserrat"/>
-              </a:rPr>
-              <a:t>                        - Generación de resúmenes y evaluaciones adaptivas</a:t>
-            </a:r>
-          </a:p>
-          <a:p>
-            <a:pPr algn="l">
-              <a:lnSpc>
-                <a:spcPts val="3440"/>
-              </a:lnSpc>
-            </a:pPr>
+            <a:endParaRPr lang="en-US" sz="2457" dirty="0">
+              <a:solidFill>
+                <a:srgbClr val="000000"/>
+              </a:solidFill>
+              <a:latin typeface="Montserrat"/>
+              <a:ea typeface="Montserrat"/>
+              <a:cs typeface="Montserrat"/>
+              <a:sym typeface="Montserrat"/>
+            </a:endParaRPr>
           </a:p>
         </p:txBody>
       </p:sp>
@@ -6668,7 +7444,7 @@
 </file>
 
 <file path=ppt/slides/slide7.xml><?xml version="1.0" encoding="utf-8"?>
-<p:sld xmlns:p="http://schemas.openxmlformats.org/presentationml/2006/main" xmlns:a="http://schemas.openxmlformats.org/drawingml/2006/main" xmlns:r="http://schemas.openxmlformats.org/officeDocument/2006/relationships">
+<p:sld xmlns:a="http://schemas.openxmlformats.org/drawingml/2006/main" xmlns:r="http://schemas.openxmlformats.org/officeDocument/2006/relationships" xmlns:p="http://schemas.openxmlformats.org/presentationml/2006/main">
   <p:cSld>
     <p:spTree>
       <p:nvGrpSpPr>
@@ -6686,12 +7462,12 @@
       </p:grpSpPr>
       <p:grpSp>
         <p:nvGrpSpPr>
-          <p:cNvPr name="Group 2" id="2"/>
+          <p:cNvPr id="2" name="Group 2"/>
           <p:cNvGrpSpPr/>
           <p:nvPr/>
         </p:nvGrpSpPr>
         <p:grpSpPr>
-          <a:xfrm rot="0">
+          <a:xfrm>
             <a:off x="0" y="0"/>
             <a:ext cx="5548048" cy="10287000"/>
             <a:chOff x="0" y="0"/>
@@ -6700,12 +7476,12 @@
         </p:grpSpPr>
         <p:sp>
           <p:nvSpPr>
-            <p:cNvPr name="Freeform 3" id="3"/>
+            <p:cNvPr id="3" name="Freeform 3"/>
             <p:cNvSpPr/>
             <p:nvPr/>
           </p:nvSpPr>
           <p:spPr>
-            <a:xfrm flipH="false" flipV="false" rot="0">
+            <a:xfrm>
               <a:off x="0" y="0"/>
               <a:ext cx="1032211" cy="1913890"/>
             </a:xfrm>
@@ -6714,9 +7490,9 @@
               <a:gdLst/>
               <a:ahLst/>
               <a:cxnLst/>
-              <a:rect r="r" b="b" t="t" l="l"/>
+              <a:rect l="l" t="t" r="r" b="b"/>
               <a:pathLst>
-                <a:path h="1913890" w="1032211">
+                <a:path w="1032211" h="1913890">
                   <a:moveTo>
                     <a:pt x="0" y="0"/>
                   </a:moveTo>
@@ -6733,7 +7509,7 @@
                 </a:path>
               </a:pathLst>
             </a:custGeom>
-            <a:gradFill rotWithShape="true">
+            <a:gradFill rotWithShape="1">
               <a:gsLst>
                 <a:gs pos="0">
                   <a:srgbClr val="8C52FF">
@@ -6749,16 +7525,23 @@
               <a:lin ang="0"/>
             </a:gradFill>
           </p:spPr>
+          <p:txBody>
+            <a:bodyPr/>
+            <a:lstStyle/>
+            <a:p>
+              <a:endParaRPr lang="es-CL"/>
+            </a:p>
+          </p:txBody>
         </p:sp>
       </p:grpSp>
       <p:sp>
         <p:nvSpPr>
-          <p:cNvPr name="Freeform 4" id="4"/>
+          <p:cNvPr id="4" name="Freeform 4"/>
           <p:cNvSpPr/>
           <p:nvPr/>
         </p:nvSpPr>
         <p:spPr>
-          <a:xfrm flipH="false" flipV="false" rot="0">
+          <a:xfrm>
             <a:off x="5548048" y="2807155"/>
             <a:ext cx="12527239" cy="7187504"/>
           </a:xfrm>
@@ -6767,9 +7550,9 @@
             <a:gdLst/>
             <a:ahLst/>
             <a:cxnLst/>
-            <a:rect r="r" b="b" t="t" l="l"/>
+            <a:rect l="l" t="t" r="r" b="b"/>
             <a:pathLst>
-              <a:path h="7187504" w="12527239">
+              <a:path w="12527239" h="7187504">
                 <a:moveTo>
                   <a:pt x="0" y="0"/>
                 </a:moveTo>
@@ -6792,19 +7575,26 @@
           <a:blipFill>
             <a:blip r:embed="rId2"/>
             <a:stretch>
-              <a:fillRect l="0" t="0" r="0" b="0"/>
+              <a:fillRect/>
             </a:stretch>
           </a:blipFill>
         </p:spPr>
-      </p:sp>
-      <p:sp>
-        <p:nvSpPr>
-          <p:cNvPr name="TextBox 5" id="5"/>
-          <p:cNvSpPr txBox="true"/>
+        <p:txBody>
+          <a:bodyPr/>
+          <a:lstStyle/>
+          <a:p>
+            <a:endParaRPr lang="es-CL"/>
+          </a:p>
+        </p:txBody>
+      </p:sp>
+      <p:sp>
+        <p:nvSpPr>
+          <p:cNvPr id="5" name="TextBox 5"/>
+          <p:cNvSpPr txBox="1"/>
           <p:nvPr/>
         </p:nvSpPr>
         <p:spPr>
-          <a:xfrm rot="0">
+          <a:xfrm>
             <a:off x="5548048" y="1200150"/>
             <a:ext cx="12069244" cy="1607005"/>
           </a:xfrm>
@@ -6813,7 +7603,7 @@
           </a:prstGeom>
         </p:spPr>
         <p:txBody>
-          <a:bodyPr anchor="t" rtlCol="false" tIns="0" lIns="0" bIns="0" rIns="0">
+          <a:bodyPr lIns="0" tIns="0" rIns="0" bIns="0" rtlCol="0" anchor="t">
             <a:spAutoFit/>
           </a:bodyPr>
           <a:lstStyle/>
@@ -6824,7 +7614,7 @@
               </a:lnSpc>
             </a:pPr>
             <a:r>
-              <a:rPr lang="en-US" b="true" sz="6584">
+              <a:rPr lang="en-US" sz="6584" b="1">
                 <a:solidFill>
                   <a:srgbClr val="000000"/>
                 </a:solidFill>
@@ -6847,7 +7637,7 @@
 </file>
 
 <file path=ppt/slides/slide8.xml><?xml version="1.0" encoding="utf-8"?>
-<p:sld xmlns:p="http://schemas.openxmlformats.org/presentationml/2006/main" xmlns:a="http://schemas.openxmlformats.org/drawingml/2006/main">
+<p:sld xmlns:a="http://schemas.openxmlformats.org/drawingml/2006/main" xmlns:r="http://schemas.openxmlformats.org/officeDocument/2006/relationships" xmlns:p="http://schemas.openxmlformats.org/presentationml/2006/main">
   <p:cSld>
     <p:spTree>
       <p:nvGrpSpPr>
@@ -6865,12 +7655,12 @@
       </p:grpSpPr>
       <p:grpSp>
         <p:nvGrpSpPr>
-          <p:cNvPr name="Group 2" id="2"/>
+          <p:cNvPr id="2" name="Group 2"/>
           <p:cNvGrpSpPr/>
           <p:nvPr/>
         </p:nvGrpSpPr>
         <p:grpSpPr>
-          <a:xfrm rot="0">
+          <a:xfrm>
             <a:off x="13448762" y="0"/>
             <a:ext cx="4839238" cy="10287000"/>
             <a:chOff x="0" y="0"/>
@@ -6879,12 +7669,12 @@
         </p:grpSpPr>
         <p:sp>
           <p:nvSpPr>
-            <p:cNvPr name="Freeform 3" id="3"/>
+            <p:cNvPr id="3" name="Freeform 3"/>
             <p:cNvSpPr/>
             <p:nvPr/>
           </p:nvSpPr>
           <p:spPr>
-            <a:xfrm flipH="false" flipV="false" rot="0">
+            <a:xfrm>
               <a:off x="0" y="0"/>
               <a:ext cx="1032211" cy="2194220"/>
             </a:xfrm>
@@ -6893,9 +7683,9 @@
               <a:gdLst/>
               <a:ahLst/>
               <a:cxnLst/>
-              <a:rect r="r" b="b" t="t" l="l"/>
+              <a:rect l="l" t="t" r="r" b="b"/>
               <a:pathLst>
-                <a:path h="2194220" w="1032211">
+                <a:path w="1032211" h="2194220">
                   <a:moveTo>
                     <a:pt x="0" y="0"/>
                   </a:moveTo>
@@ -6916,16 +7706,23 @@
               <a:srgbClr val="36528B"/>
             </a:solidFill>
           </p:spPr>
+          <p:txBody>
+            <a:bodyPr/>
+            <a:lstStyle/>
+            <a:p>
+              <a:endParaRPr lang="es-CL"/>
+            </a:p>
+          </p:txBody>
         </p:sp>
       </p:grpSp>
       <p:sp>
         <p:nvSpPr>
-          <p:cNvPr name="TextBox 4" id="4"/>
-          <p:cNvSpPr txBox="true"/>
+          <p:cNvPr id="4" name="TextBox 4"/>
+          <p:cNvSpPr txBox="1"/>
           <p:nvPr/>
         </p:nvSpPr>
         <p:spPr>
-          <a:xfrm rot="0">
+          <a:xfrm>
             <a:off x="381567" y="4815980"/>
             <a:ext cx="12893429" cy="826489"/>
           </a:xfrm>
@@ -6934,7 +7731,7 @@
           </a:prstGeom>
         </p:spPr>
         <p:txBody>
-          <a:bodyPr anchor="t" rtlCol="false" tIns="0" lIns="0" bIns="0" rIns="0">
+          <a:bodyPr lIns="0" tIns="0" rIns="0" bIns="0" rtlCol="0" anchor="t">
             <a:spAutoFit/>
           </a:bodyPr>
           <a:lstStyle/>
@@ -6945,7 +7742,7 @@
               </a:lnSpc>
             </a:pPr>
             <a:r>
-              <a:rPr lang="en-US" b="true" sz="6584">
+              <a:rPr lang="en-US" sz="6584" b="1">
                 <a:solidFill>
                   <a:srgbClr val="000000"/>
                 </a:solidFill>

</xml_diff>